<commit_message>
update Project.ipynb and added PP Presentation
</commit_message>
<xml_diff>
--- a/Präsentation_Origin_Music.pptx
+++ b/Präsentation_Origin_Music.pptx
@@ -121,6 +121,7 @@
 <file path=ppt/revisionInfo.xml><?xml version="1.0" encoding="utf-8"?>
 <p1510:revInfo xmlns:a="http://schemas.openxmlformats.org/drawingml/2006/main" xmlns:r="http://schemas.openxmlformats.org/officeDocument/2006/relationships" xmlns:p1510="http://schemas.microsoft.com/office/powerpoint/2015/10/main">
   <p1510:revLst>
+    <p1510:client id="{0711189A-A4BC-9559-D92C-469A607F0C53}" v="2" dt="2023-12-10T16:00:32.408"/>
     <p1510:client id="{657F682E-5E19-8F3A-111E-D0DDD0F334EA}" v="1656" dt="2023-12-10T15:42:26.532"/>
     <p1510:client id="{6773E97D-63C5-7943-91F7-C74DE623D708}" v="29" dt="2023-12-10T14:22:37.505"/>
     <p1510:client id="{80C7D8CD-176E-42EC-C504-A5B7BF9AD602}" v="3" dt="2023-12-10T14:26:47.480"/>
@@ -3237,21 +3238,7 @@
                 <a:ea typeface="Calibri Light"/>
                 <a:cs typeface="Calibri Light"/>
               </a:rPr>
-              <a:t> </a:t>
-            </a:r>
-            <a:r>
-              <a:rPr lang="de-DE" sz="4800" b="1" dirty="0" err="1">
-                <a:ea typeface="Calibri Light"/>
-                <a:cs typeface="Calibri Light"/>
-              </a:rPr>
-              <a:t>differnt</a:t>
-            </a:r>
-            <a:r>
-              <a:rPr lang="de-DE" sz="4800" b="1" dirty="0">
-                <a:ea typeface="Calibri Light"/>
-                <a:cs typeface="Calibri Light"/>
-              </a:rPr>
-              <a:t> </a:t>
+              <a:t> different </a:t>
             </a:r>
             <a:r>
               <a:rPr lang="de-DE" sz="4800" b="1" dirty="0" err="1">

</xml_diff>

<commit_message>
update Project.ipynb and added word
</commit_message>
<xml_diff>
--- a/Präsentation_Origin_Music.pptx
+++ b/Präsentation_Origin_Music.pptx
@@ -4,6 +4,9 @@
   <p:sldMasterIdLst>
     <p:sldMasterId id="2147483648" r:id="rId1"/>
   </p:sldMasterIdLst>
+  <p:notesMasterIdLst>
+    <p:notesMasterId r:id="rId9"/>
+  </p:notesMasterIdLst>
   <p:sldIdLst>
     <p:sldId id="256" r:id="rId2"/>
     <p:sldId id="268" r:id="rId3"/>
@@ -132,6 +135,2788 @@
 </p1510:revInfo>
 </file>
 
+<file path=ppt/notesMasters/notesMaster1.xml><?xml version="1.0" encoding="utf-8"?>
+<p:notesMaster xmlns:a="http://schemas.openxmlformats.org/drawingml/2006/main" xmlns:r="http://schemas.openxmlformats.org/officeDocument/2006/relationships" xmlns:p="http://schemas.openxmlformats.org/presentationml/2006/main">
+  <p:cSld>
+    <p:bg>
+      <p:bgRef idx="1001">
+        <a:schemeClr val="bg1"/>
+      </p:bgRef>
+    </p:bg>
+    <p:spTree>
+      <p:nvGrpSpPr>
+        <p:cNvPr id="1" name=""/>
+        <p:cNvGrpSpPr/>
+        <p:nvPr/>
+      </p:nvGrpSpPr>
+      <p:grpSpPr>
+        <a:xfrm>
+          <a:off x="0" y="0"/>
+          <a:ext cx="0" cy="0"/>
+          <a:chOff x="0" y="0"/>
+          <a:chExt cx="0" cy="0"/>
+        </a:xfrm>
+      </p:grpSpPr>
+      <p:sp>
+        <p:nvSpPr>
+          <p:cNvPr id="2" name="Kopfzeilenplatzhalter 1"/>
+          <p:cNvSpPr>
+            <a:spLocks noGrp="1"/>
+          </p:cNvSpPr>
+          <p:nvPr>
+            <p:ph type="hdr" sz="quarter"/>
+          </p:nvPr>
+        </p:nvSpPr>
+        <p:spPr>
+          <a:xfrm>
+            <a:off x="0" y="0"/>
+            <a:ext cx="2971800" cy="458788"/>
+          </a:xfrm>
+          <a:prstGeom prst="rect">
+            <a:avLst/>
+          </a:prstGeom>
+        </p:spPr>
+        <p:txBody>
+          <a:bodyPr vert="horz" lIns="91440" tIns="45720" rIns="91440" bIns="45720" rtlCol="0"/>
+          <a:lstStyle>
+            <a:lvl1pPr algn="l">
+              <a:defRPr sz="1200"/>
+            </a:lvl1pPr>
+          </a:lstStyle>
+          <a:p>
+            <a:endParaRPr lang="de-CH"/>
+          </a:p>
+        </p:txBody>
+      </p:sp>
+      <p:sp>
+        <p:nvSpPr>
+          <p:cNvPr id="3" name="Datumsplatzhalter 2"/>
+          <p:cNvSpPr>
+            <a:spLocks noGrp="1"/>
+          </p:cNvSpPr>
+          <p:nvPr>
+            <p:ph type="dt" idx="1"/>
+          </p:nvPr>
+        </p:nvSpPr>
+        <p:spPr>
+          <a:xfrm>
+            <a:off x="3884613" y="0"/>
+            <a:ext cx="2971800" cy="458788"/>
+          </a:xfrm>
+          <a:prstGeom prst="rect">
+            <a:avLst/>
+          </a:prstGeom>
+        </p:spPr>
+        <p:txBody>
+          <a:bodyPr vert="horz" lIns="91440" tIns="45720" rIns="91440" bIns="45720" rtlCol="0"/>
+          <a:lstStyle>
+            <a:lvl1pPr algn="r">
+              <a:defRPr sz="1200"/>
+            </a:lvl1pPr>
+          </a:lstStyle>
+          <a:p>
+            <a:fld id="{4FD122FE-826F-4FE2-BA30-078BCAA62D69}" type="datetimeFigureOut">
+              <a:rPr lang="de-CH" smtClean="0"/>
+              <a:t>13.12.2023</a:t>
+            </a:fld>
+            <a:endParaRPr lang="de-CH"/>
+          </a:p>
+        </p:txBody>
+      </p:sp>
+      <p:sp>
+        <p:nvSpPr>
+          <p:cNvPr id="4" name="Folienbildplatzhalter 3"/>
+          <p:cNvSpPr>
+            <a:spLocks noGrp="1" noRot="1" noChangeAspect="1"/>
+          </p:cNvSpPr>
+          <p:nvPr>
+            <p:ph type="sldImg" idx="2"/>
+          </p:nvPr>
+        </p:nvSpPr>
+        <p:spPr>
+          <a:xfrm>
+            <a:off x="685800" y="1143000"/>
+            <a:ext cx="5486400" cy="3086100"/>
+          </a:xfrm>
+          <a:prstGeom prst="rect">
+            <a:avLst/>
+          </a:prstGeom>
+          <a:noFill/>
+          <a:ln w="12700">
+            <a:solidFill>
+              <a:prstClr val="black"/>
+            </a:solidFill>
+          </a:ln>
+        </p:spPr>
+        <p:txBody>
+          <a:bodyPr vert="horz" lIns="91440" tIns="45720" rIns="91440" bIns="45720" rtlCol="0" anchor="ctr"/>
+          <a:lstStyle/>
+          <a:p>
+            <a:endParaRPr lang="de-CH"/>
+          </a:p>
+        </p:txBody>
+      </p:sp>
+      <p:sp>
+        <p:nvSpPr>
+          <p:cNvPr id="5" name="Notizenplatzhalter 4"/>
+          <p:cNvSpPr>
+            <a:spLocks noGrp="1"/>
+          </p:cNvSpPr>
+          <p:nvPr>
+            <p:ph type="body" sz="quarter" idx="3"/>
+          </p:nvPr>
+        </p:nvSpPr>
+        <p:spPr>
+          <a:xfrm>
+            <a:off x="685800" y="4400550"/>
+            <a:ext cx="5486400" cy="3600450"/>
+          </a:xfrm>
+          <a:prstGeom prst="rect">
+            <a:avLst/>
+          </a:prstGeom>
+        </p:spPr>
+        <p:txBody>
+          <a:bodyPr vert="horz" lIns="91440" tIns="45720" rIns="91440" bIns="45720" rtlCol="0"/>
+          <a:lstStyle/>
+          <a:p>
+            <a:pPr lvl="0"/>
+            <a:r>
+              <a:rPr lang="de-DE"/>
+              <a:t>Mastertextformat bearbeiten</a:t>
+            </a:r>
+          </a:p>
+          <a:p>
+            <a:pPr lvl="1"/>
+            <a:r>
+              <a:rPr lang="de-DE"/>
+              <a:t>Zweite Ebene</a:t>
+            </a:r>
+          </a:p>
+          <a:p>
+            <a:pPr lvl="2"/>
+            <a:r>
+              <a:rPr lang="de-DE"/>
+              <a:t>Dritte Ebene</a:t>
+            </a:r>
+          </a:p>
+          <a:p>
+            <a:pPr lvl="3"/>
+            <a:r>
+              <a:rPr lang="de-DE"/>
+              <a:t>Vierte Ebene</a:t>
+            </a:r>
+          </a:p>
+          <a:p>
+            <a:pPr lvl="4"/>
+            <a:r>
+              <a:rPr lang="de-DE"/>
+              <a:t>Fünfte Ebene</a:t>
+            </a:r>
+            <a:endParaRPr lang="de-CH"/>
+          </a:p>
+        </p:txBody>
+      </p:sp>
+      <p:sp>
+        <p:nvSpPr>
+          <p:cNvPr id="6" name="Fußzeilenplatzhalter 5"/>
+          <p:cNvSpPr>
+            <a:spLocks noGrp="1"/>
+          </p:cNvSpPr>
+          <p:nvPr>
+            <p:ph type="ftr" sz="quarter" idx="4"/>
+          </p:nvPr>
+        </p:nvSpPr>
+        <p:spPr>
+          <a:xfrm>
+            <a:off x="0" y="8685213"/>
+            <a:ext cx="2971800" cy="458787"/>
+          </a:xfrm>
+          <a:prstGeom prst="rect">
+            <a:avLst/>
+          </a:prstGeom>
+        </p:spPr>
+        <p:txBody>
+          <a:bodyPr vert="horz" lIns="91440" tIns="45720" rIns="91440" bIns="45720" rtlCol="0" anchor="b"/>
+          <a:lstStyle>
+            <a:lvl1pPr algn="l">
+              <a:defRPr sz="1200"/>
+            </a:lvl1pPr>
+          </a:lstStyle>
+          <a:p>
+            <a:endParaRPr lang="de-CH"/>
+          </a:p>
+        </p:txBody>
+      </p:sp>
+      <p:sp>
+        <p:nvSpPr>
+          <p:cNvPr id="7" name="Foliennummernplatzhalter 6"/>
+          <p:cNvSpPr>
+            <a:spLocks noGrp="1"/>
+          </p:cNvSpPr>
+          <p:nvPr>
+            <p:ph type="sldNum" sz="quarter" idx="5"/>
+          </p:nvPr>
+        </p:nvSpPr>
+        <p:spPr>
+          <a:xfrm>
+            <a:off x="3884613" y="8685213"/>
+            <a:ext cx="2971800" cy="458787"/>
+          </a:xfrm>
+          <a:prstGeom prst="rect">
+            <a:avLst/>
+          </a:prstGeom>
+        </p:spPr>
+        <p:txBody>
+          <a:bodyPr vert="horz" lIns="91440" tIns="45720" rIns="91440" bIns="45720" rtlCol="0" anchor="b"/>
+          <a:lstStyle>
+            <a:lvl1pPr algn="r">
+              <a:defRPr sz="1200"/>
+            </a:lvl1pPr>
+          </a:lstStyle>
+          <a:p>
+            <a:fld id="{F08A1825-D802-43E6-88CE-6E727D15DE22}" type="slidenum">
+              <a:rPr lang="de-CH" smtClean="0"/>
+              <a:t>‹Nr.›</a:t>
+            </a:fld>
+            <a:endParaRPr lang="de-CH"/>
+          </a:p>
+        </p:txBody>
+      </p:sp>
+    </p:spTree>
+    <p:extLst>
+      <p:ext uri="{BB962C8B-B14F-4D97-AF65-F5344CB8AC3E}">
+        <p14:creationId xmlns:p14="http://schemas.microsoft.com/office/powerpoint/2010/main" val="1377165327"/>
+      </p:ext>
+    </p:extLst>
+  </p:cSld>
+  <p:clrMap bg1="lt1" tx1="dk1" bg2="lt2" tx2="dk2" accent1="accent1" accent2="accent2" accent3="accent3" accent4="accent4" accent5="accent5" accent6="accent6" hlink="hlink" folHlink="folHlink"/>
+  <p:notesStyle>
+    <a:lvl1pPr marL="0" algn="l" defTabSz="914400" rtl="0" eaLnBrk="1" latinLnBrk="0" hangingPunct="1">
+      <a:defRPr sz="1200" kern="1200">
+        <a:solidFill>
+          <a:schemeClr val="tx1"/>
+        </a:solidFill>
+        <a:latin typeface="+mn-lt"/>
+        <a:ea typeface="+mn-ea"/>
+        <a:cs typeface="+mn-cs"/>
+      </a:defRPr>
+    </a:lvl1pPr>
+    <a:lvl2pPr marL="457200" algn="l" defTabSz="914400" rtl="0" eaLnBrk="1" latinLnBrk="0" hangingPunct="1">
+      <a:defRPr sz="1200" kern="1200">
+        <a:solidFill>
+          <a:schemeClr val="tx1"/>
+        </a:solidFill>
+        <a:latin typeface="+mn-lt"/>
+        <a:ea typeface="+mn-ea"/>
+        <a:cs typeface="+mn-cs"/>
+      </a:defRPr>
+    </a:lvl2pPr>
+    <a:lvl3pPr marL="914400" algn="l" defTabSz="914400" rtl="0" eaLnBrk="1" latinLnBrk="0" hangingPunct="1">
+      <a:defRPr sz="1200" kern="1200">
+        <a:solidFill>
+          <a:schemeClr val="tx1"/>
+        </a:solidFill>
+        <a:latin typeface="+mn-lt"/>
+        <a:ea typeface="+mn-ea"/>
+        <a:cs typeface="+mn-cs"/>
+      </a:defRPr>
+    </a:lvl3pPr>
+    <a:lvl4pPr marL="1371600" algn="l" defTabSz="914400" rtl="0" eaLnBrk="1" latinLnBrk="0" hangingPunct="1">
+      <a:defRPr sz="1200" kern="1200">
+        <a:solidFill>
+          <a:schemeClr val="tx1"/>
+        </a:solidFill>
+        <a:latin typeface="+mn-lt"/>
+        <a:ea typeface="+mn-ea"/>
+        <a:cs typeface="+mn-cs"/>
+      </a:defRPr>
+    </a:lvl4pPr>
+    <a:lvl5pPr marL="1828800" algn="l" defTabSz="914400" rtl="0" eaLnBrk="1" latinLnBrk="0" hangingPunct="1">
+      <a:defRPr sz="1200" kern="1200">
+        <a:solidFill>
+          <a:schemeClr val="tx1"/>
+        </a:solidFill>
+        <a:latin typeface="+mn-lt"/>
+        <a:ea typeface="+mn-ea"/>
+        <a:cs typeface="+mn-cs"/>
+      </a:defRPr>
+    </a:lvl5pPr>
+    <a:lvl6pPr marL="2286000" algn="l" defTabSz="914400" rtl="0" eaLnBrk="1" latinLnBrk="0" hangingPunct="1">
+      <a:defRPr sz="1200" kern="1200">
+        <a:solidFill>
+          <a:schemeClr val="tx1"/>
+        </a:solidFill>
+        <a:latin typeface="+mn-lt"/>
+        <a:ea typeface="+mn-ea"/>
+        <a:cs typeface="+mn-cs"/>
+      </a:defRPr>
+    </a:lvl6pPr>
+    <a:lvl7pPr marL="2743200" algn="l" defTabSz="914400" rtl="0" eaLnBrk="1" latinLnBrk="0" hangingPunct="1">
+      <a:defRPr sz="1200" kern="1200">
+        <a:solidFill>
+          <a:schemeClr val="tx1"/>
+        </a:solidFill>
+        <a:latin typeface="+mn-lt"/>
+        <a:ea typeface="+mn-ea"/>
+        <a:cs typeface="+mn-cs"/>
+      </a:defRPr>
+    </a:lvl7pPr>
+    <a:lvl8pPr marL="3200400" algn="l" defTabSz="914400" rtl="0" eaLnBrk="1" latinLnBrk="0" hangingPunct="1">
+      <a:defRPr sz="1200" kern="1200">
+        <a:solidFill>
+          <a:schemeClr val="tx1"/>
+        </a:solidFill>
+        <a:latin typeface="+mn-lt"/>
+        <a:ea typeface="+mn-ea"/>
+        <a:cs typeface="+mn-cs"/>
+      </a:defRPr>
+    </a:lvl8pPr>
+    <a:lvl9pPr marL="3657600" algn="l" defTabSz="914400" rtl="0" eaLnBrk="1" latinLnBrk="0" hangingPunct="1">
+      <a:defRPr sz="1200" kern="1200">
+        <a:solidFill>
+          <a:schemeClr val="tx1"/>
+        </a:solidFill>
+        <a:latin typeface="+mn-lt"/>
+        <a:ea typeface="+mn-ea"/>
+        <a:cs typeface="+mn-cs"/>
+      </a:defRPr>
+    </a:lvl9pPr>
+  </p:notesStyle>
+</p:notesMaster>
+</file>
+
+<file path=ppt/notesSlides/notesSlide1.xml><?xml version="1.0" encoding="utf-8"?>
+<p:notes xmlns:a="http://schemas.openxmlformats.org/drawingml/2006/main" xmlns:r="http://schemas.openxmlformats.org/officeDocument/2006/relationships" xmlns:p="http://schemas.openxmlformats.org/presentationml/2006/main">
+  <p:cSld>
+    <p:spTree>
+      <p:nvGrpSpPr>
+        <p:cNvPr id="1" name=""/>
+        <p:cNvGrpSpPr/>
+        <p:nvPr/>
+      </p:nvGrpSpPr>
+      <p:grpSpPr>
+        <a:xfrm>
+          <a:off x="0" y="0"/>
+          <a:ext cx="0" cy="0"/>
+          <a:chOff x="0" y="0"/>
+          <a:chExt cx="0" cy="0"/>
+        </a:xfrm>
+      </p:grpSpPr>
+      <p:sp>
+        <p:nvSpPr>
+          <p:cNvPr id="2" name="Folienbildplatzhalter 1"/>
+          <p:cNvSpPr>
+            <a:spLocks noGrp="1" noRot="1" noChangeAspect="1"/>
+          </p:cNvSpPr>
+          <p:nvPr>
+            <p:ph type="sldImg"/>
+          </p:nvPr>
+        </p:nvSpPr>
+        <p:spPr/>
+      </p:sp>
+      <p:sp>
+        <p:nvSpPr>
+          <p:cNvPr id="3" name="Notizenplatzhalter 2"/>
+          <p:cNvSpPr>
+            <a:spLocks noGrp="1"/>
+          </p:cNvSpPr>
+          <p:nvPr>
+            <p:ph type="body" idx="1"/>
+          </p:nvPr>
+        </p:nvSpPr>
+        <p:spPr/>
+        <p:txBody>
+          <a:bodyPr/>
+          <a:lstStyle/>
+          <a:p>
+            <a:r>
+              <a:rPr lang="de-CH" dirty="0"/>
+              <a:t>Welcome </a:t>
+            </a:r>
+            <a:r>
+              <a:rPr lang="de-CH" dirty="0" err="1"/>
+              <a:t>to</a:t>
+            </a:r>
+            <a:r>
+              <a:rPr lang="de-CH" dirty="0"/>
+              <a:t> </a:t>
+            </a:r>
+            <a:r>
+              <a:rPr lang="de-CH" dirty="0" err="1"/>
+              <a:t>my</a:t>
+            </a:r>
+            <a:r>
+              <a:rPr lang="de-CH" dirty="0"/>
+              <a:t> </a:t>
+            </a:r>
+            <a:r>
+              <a:rPr lang="de-CH" dirty="0" err="1"/>
+              <a:t>short</a:t>
+            </a:r>
+            <a:r>
+              <a:rPr lang="de-CH" dirty="0"/>
+              <a:t> </a:t>
+            </a:r>
+            <a:r>
+              <a:rPr lang="de-CH" dirty="0" err="1"/>
+              <a:t>presentation</a:t>
+            </a:r>
+            <a:r>
+              <a:rPr lang="de-CH" dirty="0"/>
+              <a:t> </a:t>
+            </a:r>
+            <a:r>
+              <a:rPr lang="de-CH" dirty="0" err="1"/>
+              <a:t>of</a:t>
+            </a:r>
+            <a:r>
+              <a:rPr lang="de-CH" dirty="0"/>
+              <a:t> </a:t>
+            </a:r>
+            <a:r>
+              <a:rPr lang="de-CH" dirty="0" err="1"/>
+              <a:t>my</a:t>
+            </a:r>
+            <a:r>
+              <a:rPr lang="de-CH" dirty="0"/>
+              <a:t> </a:t>
+            </a:r>
+            <a:r>
+              <a:rPr lang="de-CH" dirty="0" err="1"/>
+              <a:t>project</a:t>
+            </a:r>
+            <a:r>
+              <a:rPr lang="de-CH" dirty="0"/>
+              <a:t>. In </a:t>
+            </a:r>
+            <a:r>
+              <a:rPr lang="de-CH" dirty="0" err="1"/>
+              <a:t>my</a:t>
+            </a:r>
+            <a:r>
+              <a:rPr lang="de-CH" dirty="0"/>
+              <a:t> </a:t>
+            </a:r>
+            <a:r>
+              <a:rPr lang="de-CH" dirty="0" err="1"/>
+              <a:t>project</a:t>
+            </a:r>
+            <a:r>
+              <a:rPr lang="de-CH" dirty="0"/>
+              <a:t> </a:t>
+            </a:r>
+            <a:r>
+              <a:rPr lang="de-CH" dirty="0" err="1"/>
+              <a:t>music</a:t>
+            </a:r>
+            <a:r>
+              <a:rPr lang="de-CH" dirty="0"/>
+              <a:t> </a:t>
+            </a:r>
+            <a:r>
+              <a:rPr lang="de-CH" dirty="0" err="1"/>
+              <a:t>is</a:t>
+            </a:r>
+            <a:r>
+              <a:rPr lang="de-CH" dirty="0"/>
+              <a:t> </a:t>
+            </a:r>
+            <a:r>
+              <a:rPr lang="de-CH" dirty="0" err="1"/>
+              <a:t>important</a:t>
+            </a:r>
+            <a:r>
+              <a:rPr lang="de-CH" dirty="0"/>
+              <a:t>. </a:t>
+            </a:r>
+            <a:r>
+              <a:rPr lang="de-CH" dirty="0" err="1"/>
+              <a:t>Especially</a:t>
+            </a:r>
+            <a:r>
+              <a:rPr lang="de-CH" dirty="0"/>
+              <a:t> </a:t>
+            </a:r>
+            <a:r>
+              <a:rPr lang="de-CH" dirty="0" err="1"/>
+              <a:t>the</a:t>
+            </a:r>
+            <a:r>
+              <a:rPr lang="de-CH" dirty="0"/>
+              <a:t> </a:t>
+            </a:r>
+            <a:r>
+              <a:rPr lang="de-CH" dirty="0" err="1"/>
+              <a:t>spatial</a:t>
+            </a:r>
+            <a:r>
+              <a:rPr lang="de-CH" dirty="0"/>
+              <a:t> </a:t>
+            </a:r>
+            <a:r>
+              <a:rPr lang="de-CH" dirty="0" err="1"/>
+              <a:t>information</a:t>
+            </a:r>
+            <a:r>
+              <a:rPr lang="de-CH" dirty="0"/>
+              <a:t> </a:t>
+            </a:r>
+            <a:r>
+              <a:rPr lang="de-CH" dirty="0" err="1"/>
+              <a:t>behind</a:t>
+            </a:r>
+            <a:r>
+              <a:rPr lang="de-CH" dirty="0"/>
+              <a:t> </a:t>
+            </a:r>
+            <a:r>
+              <a:rPr lang="de-CH" dirty="0" err="1"/>
+              <a:t>the</a:t>
+            </a:r>
+            <a:r>
+              <a:rPr lang="de-CH" dirty="0"/>
+              <a:t> </a:t>
+            </a:r>
+            <a:r>
+              <a:rPr lang="de-CH" dirty="0" err="1"/>
+              <a:t>music</a:t>
+            </a:r>
+            <a:r>
+              <a:rPr lang="de-CH" dirty="0"/>
+              <a:t>.</a:t>
+            </a:r>
+          </a:p>
+        </p:txBody>
+      </p:sp>
+      <p:sp>
+        <p:nvSpPr>
+          <p:cNvPr id="4" name="Foliennummernplatzhalter 3"/>
+          <p:cNvSpPr>
+            <a:spLocks noGrp="1"/>
+          </p:cNvSpPr>
+          <p:nvPr>
+            <p:ph type="sldNum" sz="quarter" idx="5"/>
+          </p:nvPr>
+        </p:nvSpPr>
+        <p:spPr/>
+        <p:txBody>
+          <a:bodyPr/>
+          <a:lstStyle/>
+          <a:p>
+            <a:fld id="{F08A1825-D802-43E6-88CE-6E727D15DE22}" type="slidenum">
+              <a:rPr lang="de-CH" smtClean="0"/>
+              <a:t>1</a:t>
+            </a:fld>
+            <a:endParaRPr lang="de-CH"/>
+          </a:p>
+        </p:txBody>
+      </p:sp>
+    </p:spTree>
+    <p:extLst>
+      <p:ext uri="{BB962C8B-B14F-4D97-AF65-F5344CB8AC3E}">
+        <p14:creationId xmlns:p14="http://schemas.microsoft.com/office/powerpoint/2010/main" val="2086299997"/>
+      </p:ext>
+    </p:extLst>
+  </p:cSld>
+  <p:clrMapOvr>
+    <a:masterClrMapping/>
+  </p:clrMapOvr>
+</p:notes>
+</file>
+
+<file path=ppt/notesSlides/notesSlide2.xml><?xml version="1.0" encoding="utf-8"?>
+<p:notes xmlns:a="http://schemas.openxmlformats.org/drawingml/2006/main" xmlns:r="http://schemas.openxmlformats.org/officeDocument/2006/relationships" xmlns:p="http://schemas.openxmlformats.org/presentationml/2006/main">
+  <p:cSld>
+    <p:spTree>
+      <p:nvGrpSpPr>
+        <p:cNvPr id="1" name=""/>
+        <p:cNvGrpSpPr/>
+        <p:nvPr/>
+      </p:nvGrpSpPr>
+      <p:grpSpPr>
+        <a:xfrm>
+          <a:off x="0" y="0"/>
+          <a:ext cx="0" cy="0"/>
+          <a:chOff x="0" y="0"/>
+          <a:chExt cx="0" cy="0"/>
+        </a:xfrm>
+      </p:grpSpPr>
+      <p:sp>
+        <p:nvSpPr>
+          <p:cNvPr id="2" name="Folienbildplatzhalter 1"/>
+          <p:cNvSpPr>
+            <a:spLocks noGrp="1" noRot="1" noChangeAspect="1"/>
+          </p:cNvSpPr>
+          <p:nvPr>
+            <p:ph type="sldImg"/>
+          </p:nvPr>
+        </p:nvSpPr>
+        <p:spPr/>
+      </p:sp>
+      <p:sp>
+        <p:nvSpPr>
+          <p:cNvPr id="3" name="Notizenplatzhalter 2"/>
+          <p:cNvSpPr>
+            <a:spLocks noGrp="1"/>
+          </p:cNvSpPr>
+          <p:nvPr>
+            <p:ph type="body" idx="1"/>
+          </p:nvPr>
+        </p:nvSpPr>
+        <p:spPr/>
+        <p:txBody>
+          <a:bodyPr/>
+          <a:lstStyle/>
+          <a:p>
+            <a:r>
+              <a:rPr lang="de-CH" dirty="0"/>
+              <a:t>This </a:t>
+            </a:r>
+            <a:r>
+              <a:rPr lang="de-CH" dirty="0" err="1"/>
+              <a:t>is</a:t>
+            </a:r>
+            <a:r>
+              <a:rPr lang="de-CH" dirty="0"/>
+              <a:t> </a:t>
+            </a:r>
+            <a:r>
+              <a:rPr lang="de-CH" dirty="0" err="1"/>
+              <a:t>my</a:t>
+            </a:r>
+            <a:r>
+              <a:rPr lang="de-CH" dirty="0"/>
+              <a:t> </a:t>
+            </a:r>
+            <a:r>
+              <a:rPr lang="de-CH" dirty="0" err="1"/>
+              <a:t>research</a:t>
+            </a:r>
+            <a:r>
+              <a:rPr lang="de-CH" dirty="0"/>
+              <a:t> </a:t>
+            </a:r>
+            <a:r>
+              <a:rPr lang="de-CH" dirty="0" err="1"/>
+              <a:t>question</a:t>
+            </a:r>
+            <a:r>
+              <a:rPr lang="de-CH" dirty="0"/>
+              <a:t>:</a:t>
+            </a:r>
+          </a:p>
+          <a:p>
+            <a:pPr marL="0" marR="0" lvl="0" indent="0" algn="l" defTabSz="914400" rtl="0" eaLnBrk="1" fontAlgn="auto" latinLnBrk="0" hangingPunct="1">
+              <a:lnSpc>
+                <a:spcPct val="100000"/>
+              </a:lnSpc>
+              <a:spcBef>
+                <a:spcPts val="0"/>
+              </a:spcBef>
+              <a:spcAft>
+                <a:spcPts val="0"/>
+              </a:spcAft>
+              <a:buClrTx/>
+              <a:buSzTx/>
+              <a:buFontTx/>
+              <a:buNone/>
+              <a:tabLst/>
+              <a:defRPr/>
+            </a:pPr>
+            <a:r>
+              <a:rPr lang="en-US" dirty="0">
+                <a:solidFill>
+                  <a:srgbClr val="303030"/>
+                </a:solidFill>
+                <a:ea typeface="+mn-lt"/>
+                <a:cs typeface="+mn-lt"/>
+              </a:rPr>
+              <a:t>Can tree based machine learning accurately classify traditional, ethnic, or 'world' genre-based music on audio features extracted by the </a:t>
+            </a:r>
+            <a:r>
+              <a:rPr lang="en-US" dirty="0">
+                <a:solidFill>
+                  <a:srgbClr val="303030"/>
+                </a:solidFill>
+              </a:rPr>
+              <a:t>MARSYAS framework?</a:t>
+            </a:r>
+          </a:p>
+          <a:p>
+            <a:pPr marL="0" marR="0" lvl="0" indent="0" algn="l" defTabSz="914400" rtl="0" eaLnBrk="1" fontAlgn="auto" latinLnBrk="0" hangingPunct="1">
+              <a:lnSpc>
+                <a:spcPct val="100000"/>
+              </a:lnSpc>
+              <a:spcBef>
+                <a:spcPts val="0"/>
+              </a:spcBef>
+              <a:spcAft>
+                <a:spcPts val="0"/>
+              </a:spcAft>
+              <a:buClrTx/>
+              <a:buSzTx/>
+              <a:buFontTx/>
+              <a:buNone/>
+              <a:tabLst/>
+              <a:defRPr/>
+            </a:pPr>
+            <a:endParaRPr lang="en-US" dirty="0">
+              <a:solidFill>
+                <a:srgbClr val="303030"/>
+              </a:solidFill>
+              <a:ea typeface="+mn-lt"/>
+              <a:cs typeface="+mn-lt"/>
+            </a:endParaRPr>
+          </a:p>
+          <a:p>
+            <a:pPr marL="0" marR="0" lvl="0" indent="0" algn="l" defTabSz="914400" rtl="0" eaLnBrk="1" fontAlgn="auto" latinLnBrk="0" hangingPunct="1">
+              <a:lnSpc>
+                <a:spcPct val="100000"/>
+              </a:lnSpc>
+              <a:spcBef>
+                <a:spcPts val="0"/>
+              </a:spcBef>
+              <a:spcAft>
+                <a:spcPts val="0"/>
+              </a:spcAft>
+              <a:buClrTx/>
+              <a:buSzTx/>
+              <a:buFontTx/>
+              <a:buNone/>
+              <a:tabLst/>
+              <a:defRPr/>
+            </a:pPr>
+            <a:r>
+              <a:rPr lang="en-US" dirty="0">
+                <a:solidFill>
+                  <a:srgbClr val="303030"/>
+                </a:solidFill>
+                <a:ea typeface="+mn-lt"/>
+                <a:cs typeface="+mn-lt"/>
+              </a:rPr>
+              <a:t>I have focused on this three types of music, because western </a:t>
+            </a:r>
+            <a:r>
+              <a:rPr lang="en-US" dirty="0" err="1">
+                <a:solidFill>
+                  <a:srgbClr val="303030"/>
+                </a:solidFill>
+                <a:ea typeface="+mn-lt"/>
+                <a:cs typeface="+mn-lt"/>
+              </a:rPr>
+              <a:t>musics</a:t>
+            </a:r>
+            <a:r>
+              <a:rPr lang="en-US" dirty="0">
+                <a:solidFill>
+                  <a:srgbClr val="303030"/>
+                </a:solidFill>
+                <a:ea typeface="+mn-lt"/>
+                <a:cs typeface="+mn-lt"/>
+              </a:rPr>
+              <a:t> influence is global.</a:t>
+            </a:r>
+          </a:p>
+          <a:p>
+            <a:pPr marL="0" marR="0" lvl="0" indent="0" algn="l" defTabSz="914400" rtl="0" eaLnBrk="1" fontAlgn="auto" latinLnBrk="0" hangingPunct="1">
+              <a:lnSpc>
+                <a:spcPct val="100000"/>
+              </a:lnSpc>
+              <a:spcBef>
+                <a:spcPts val="0"/>
+              </a:spcBef>
+              <a:spcAft>
+                <a:spcPts val="0"/>
+              </a:spcAft>
+              <a:buClrTx/>
+              <a:buSzTx/>
+              <a:buFontTx/>
+              <a:buNone/>
+              <a:tabLst/>
+              <a:defRPr/>
+            </a:pPr>
+            <a:endParaRPr lang="en-US" dirty="0">
+              <a:solidFill>
+                <a:srgbClr val="303030"/>
+              </a:solidFill>
+              <a:ea typeface="+mn-lt"/>
+              <a:cs typeface="+mn-lt"/>
+            </a:endParaRPr>
+          </a:p>
+          <a:p>
+            <a:pPr marL="0" marR="0" lvl="0" indent="0" algn="l" defTabSz="914400" rtl="0" eaLnBrk="1" fontAlgn="auto" latinLnBrk="0" hangingPunct="1">
+              <a:lnSpc>
+                <a:spcPct val="100000"/>
+              </a:lnSpc>
+              <a:spcBef>
+                <a:spcPts val="0"/>
+              </a:spcBef>
+              <a:spcAft>
+                <a:spcPts val="0"/>
+              </a:spcAft>
+              <a:buClrTx/>
+              <a:buSzTx/>
+              <a:buFontTx/>
+              <a:buNone/>
+              <a:tabLst/>
+              <a:defRPr/>
+            </a:pPr>
+            <a:r>
+              <a:rPr lang="en-US" dirty="0">
+                <a:solidFill>
+                  <a:srgbClr val="303030"/>
+                </a:solidFill>
+                <a:ea typeface="+mn-lt"/>
+                <a:cs typeface="+mn-lt"/>
+              </a:rPr>
+              <a:t>You may wonder, why does it fit into the scope of this lecture.</a:t>
+            </a:r>
+          </a:p>
+        </p:txBody>
+      </p:sp>
+      <p:sp>
+        <p:nvSpPr>
+          <p:cNvPr id="4" name="Foliennummernplatzhalter 3"/>
+          <p:cNvSpPr>
+            <a:spLocks noGrp="1"/>
+          </p:cNvSpPr>
+          <p:nvPr>
+            <p:ph type="sldNum" sz="quarter" idx="5"/>
+          </p:nvPr>
+        </p:nvSpPr>
+        <p:spPr/>
+        <p:txBody>
+          <a:bodyPr/>
+          <a:lstStyle/>
+          <a:p>
+            <a:fld id="{F08A1825-D802-43E6-88CE-6E727D15DE22}" type="slidenum">
+              <a:rPr lang="de-CH" smtClean="0"/>
+              <a:t>2</a:t>
+            </a:fld>
+            <a:endParaRPr lang="de-CH"/>
+          </a:p>
+        </p:txBody>
+      </p:sp>
+    </p:spTree>
+    <p:extLst>
+      <p:ext uri="{BB962C8B-B14F-4D97-AF65-F5344CB8AC3E}">
+        <p14:creationId xmlns:p14="http://schemas.microsoft.com/office/powerpoint/2010/main" val="3424953311"/>
+      </p:ext>
+    </p:extLst>
+  </p:cSld>
+  <p:clrMapOvr>
+    <a:masterClrMapping/>
+  </p:clrMapOvr>
+</p:notes>
+</file>
+
+<file path=ppt/notesSlides/notesSlide3.xml><?xml version="1.0" encoding="utf-8"?>
+<p:notes xmlns:a="http://schemas.openxmlformats.org/drawingml/2006/main" xmlns:r="http://schemas.openxmlformats.org/officeDocument/2006/relationships" xmlns:p="http://schemas.openxmlformats.org/presentationml/2006/main">
+  <p:cSld>
+    <p:spTree>
+      <p:nvGrpSpPr>
+        <p:cNvPr id="1" name=""/>
+        <p:cNvGrpSpPr/>
+        <p:nvPr/>
+      </p:nvGrpSpPr>
+      <p:grpSpPr>
+        <a:xfrm>
+          <a:off x="0" y="0"/>
+          <a:ext cx="0" cy="0"/>
+          <a:chOff x="0" y="0"/>
+          <a:chExt cx="0" cy="0"/>
+        </a:xfrm>
+      </p:grpSpPr>
+      <p:sp>
+        <p:nvSpPr>
+          <p:cNvPr id="2" name="Folienbildplatzhalter 1"/>
+          <p:cNvSpPr>
+            <a:spLocks noGrp="1" noRot="1" noChangeAspect="1"/>
+          </p:cNvSpPr>
+          <p:nvPr>
+            <p:ph type="sldImg"/>
+          </p:nvPr>
+        </p:nvSpPr>
+        <p:spPr/>
+      </p:sp>
+      <p:sp>
+        <p:nvSpPr>
+          <p:cNvPr id="3" name="Notizenplatzhalter 2"/>
+          <p:cNvSpPr>
+            <a:spLocks noGrp="1"/>
+          </p:cNvSpPr>
+          <p:nvPr>
+            <p:ph type="body" idx="1"/>
+          </p:nvPr>
+        </p:nvSpPr>
+        <p:spPr/>
+        <p:txBody>
+          <a:bodyPr/>
+          <a:lstStyle/>
+          <a:p>
+            <a:r>
+              <a:rPr lang="de-CH" dirty="0"/>
+              <a:t>In </a:t>
+            </a:r>
+            <a:r>
+              <a:rPr lang="de-CH" dirty="0" err="1"/>
+              <a:t>this</a:t>
+            </a:r>
+            <a:r>
+              <a:rPr lang="de-CH" dirty="0"/>
+              <a:t> lecture, </a:t>
+            </a:r>
+            <a:r>
+              <a:rPr lang="de-CH" dirty="0" err="1"/>
+              <a:t>we</a:t>
+            </a:r>
+            <a:r>
+              <a:rPr lang="de-CH" dirty="0"/>
+              <a:t> </a:t>
+            </a:r>
+            <a:r>
+              <a:rPr lang="de-CH" dirty="0" err="1"/>
+              <a:t>mainly</a:t>
+            </a:r>
+            <a:r>
+              <a:rPr lang="de-CH" dirty="0"/>
+              <a:t> </a:t>
+            </a:r>
+            <a:r>
+              <a:rPr lang="de-CH" dirty="0" err="1"/>
+              <a:t>focus</a:t>
+            </a:r>
+            <a:r>
+              <a:rPr lang="de-CH" dirty="0"/>
+              <a:t> on </a:t>
+            </a:r>
+            <a:r>
+              <a:rPr lang="de-CH" dirty="0" err="1"/>
+              <a:t>geographic</a:t>
+            </a:r>
+            <a:r>
+              <a:rPr lang="de-CH" dirty="0"/>
+              <a:t> </a:t>
+            </a:r>
+            <a:r>
+              <a:rPr lang="de-CH" dirty="0" err="1"/>
+              <a:t>infromation</a:t>
+            </a:r>
+            <a:r>
+              <a:rPr lang="de-CH" dirty="0"/>
+              <a:t> in </a:t>
+            </a:r>
+            <a:r>
+              <a:rPr lang="de-CH" dirty="0" err="1"/>
+              <a:t>text</a:t>
+            </a:r>
+            <a:r>
+              <a:rPr lang="de-CH" dirty="0"/>
+              <a:t>. Music, like text-based </a:t>
+            </a:r>
+            <a:r>
+              <a:rPr lang="de-CH" dirty="0" err="1"/>
+              <a:t>information</a:t>
+            </a:r>
+            <a:r>
+              <a:rPr lang="de-CH" dirty="0"/>
+              <a:t> </a:t>
+            </a:r>
+            <a:r>
+              <a:rPr lang="de-CH" dirty="0" err="1"/>
+              <a:t>are</a:t>
+            </a:r>
+            <a:r>
+              <a:rPr lang="de-CH" dirty="0"/>
+              <a:t> a </a:t>
+            </a:r>
+            <a:r>
+              <a:rPr lang="de-CH" dirty="0" err="1"/>
+              <a:t>combination</a:t>
+            </a:r>
+            <a:r>
+              <a:rPr lang="de-CH" dirty="0"/>
+              <a:t> </a:t>
+            </a:r>
+            <a:r>
+              <a:rPr lang="de-CH" dirty="0" err="1"/>
+              <a:t>of</a:t>
+            </a:r>
+            <a:r>
+              <a:rPr lang="de-CH" dirty="0"/>
+              <a:t> different </a:t>
+            </a:r>
+            <a:r>
+              <a:rPr lang="de-CH" dirty="0" err="1"/>
+              <a:t>wavelengths</a:t>
+            </a:r>
+            <a:r>
+              <a:rPr lang="de-CH" dirty="0"/>
+              <a:t> in a temporal </a:t>
+            </a:r>
+            <a:r>
+              <a:rPr lang="de-CH" dirty="0" err="1"/>
+              <a:t>order</a:t>
+            </a:r>
+            <a:r>
+              <a:rPr lang="de-CH" dirty="0"/>
+              <a:t>.</a:t>
+            </a:r>
+          </a:p>
+          <a:p>
+            <a:endParaRPr lang="de-CH" dirty="0"/>
+          </a:p>
+          <a:p>
+            <a:r>
+              <a:rPr lang="de-CH" dirty="0"/>
+              <a:t>This </a:t>
+            </a:r>
+            <a:r>
+              <a:rPr lang="de-CH" dirty="0" err="1"/>
+              <a:t>can</a:t>
+            </a:r>
+            <a:r>
+              <a:rPr lang="de-CH" dirty="0"/>
+              <a:t> </a:t>
+            </a:r>
+            <a:r>
+              <a:rPr lang="de-CH" dirty="0" err="1"/>
+              <a:t>be</a:t>
+            </a:r>
+            <a:r>
+              <a:rPr lang="de-CH" dirty="0"/>
+              <a:t> </a:t>
+            </a:r>
+            <a:r>
+              <a:rPr lang="de-CH" dirty="0" err="1"/>
+              <a:t>seen</a:t>
+            </a:r>
+            <a:r>
+              <a:rPr lang="de-CH" dirty="0"/>
+              <a:t> in </a:t>
+            </a:r>
+            <a:r>
+              <a:rPr lang="de-CH" dirty="0" err="1"/>
+              <a:t>the</a:t>
+            </a:r>
+            <a:r>
+              <a:rPr lang="de-CH" dirty="0"/>
+              <a:t> </a:t>
+            </a:r>
+            <a:r>
+              <a:rPr lang="de-CH" dirty="0" err="1"/>
+              <a:t>figure</a:t>
+            </a:r>
+            <a:r>
+              <a:rPr lang="de-CH" dirty="0"/>
+              <a:t>. </a:t>
+            </a:r>
+            <a:r>
+              <a:rPr lang="de-CH" dirty="0" err="1"/>
+              <a:t>There</a:t>
+            </a:r>
+            <a:r>
+              <a:rPr lang="de-CH" dirty="0"/>
+              <a:t> </a:t>
+            </a:r>
+            <a:r>
+              <a:rPr lang="de-CH" dirty="0" err="1"/>
+              <a:t>is</a:t>
+            </a:r>
+            <a:r>
+              <a:rPr lang="de-CH" dirty="0"/>
+              <a:t> an </a:t>
+            </a:r>
+            <a:r>
+              <a:rPr lang="de-CH" dirty="0" err="1"/>
+              <a:t>order</a:t>
+            </a:r>
+            <a:r>
+              <a:rPr lang="de-CH" dirty="0"/>
+              <a:t> in </a:t>
+            </a:r>
+            <a:r>
+              <a:rPr lang="de-CH" dirty="0" err="1"/>
+              <a:t>the</a:t>
+            </a:r>
+            <a:r>
+              <a:rPr lang="de-CH" dirty="0"/>
+              <a:t> </a:t>
+            </a:r>
+            <a:r>
+              <a:rPr lang="de-CH" dirty="0" err="1"/>
+              <a:t>sound</a:t>
+            </a:r>
+            <a:r>
+              <a:rPr lang="de-CH" dirty="0"/>
+              <a:t> </a:t>
+            </a:r>
+            <a:r>
+              <a:rPr lang="de-CH" dirty="0" err="1"/>
+              <a:t>amplitude</a:t>
+            </a:r>
+            <a:r>
+              <a:rPr lang="de-CH" dirty="0"/>
+              <a:t>, and </a:t>
+            </a:r>
+            <a:r>
+              <a:rPr lang="de-CH" dirty="0" err="1"/>
+              <a:t>this</a:t>
+            </a:r>
+            <a:r>
+              <a:rPr lang="de-CH" dirty="0"/>
+              <a:t> results in a text-based </a:t>
+            </a:r>
+            <a:r>
+              <a:rPr lang="de-CH" dirty="0" err="1"/>
+              <a:t>information</a:t>
+            </a:r>
+            <a:r>
+              <a:rPr lang="de-CH" dirty="0"/>
+              <a:t>, </a:t>
+            </a:r>
+            <a:r>
+              <a:rPr lang="de-CH" dirty="0" err="1"/>
+              <a:t>seen</a:t>
+            </a:r>
+            <a:r>
+              <a:rPr lang="de-CH" dirty="0"/>
+              <a:t> in </a:t>
+            </a:r>
+            <a:r>
+              <a:rPr lang="de-CH" dirty="0" err="1"/>
+              <a:t>the</a:t>
+            </a:r>
+            <a:r>
+              <a:rPr lang="de-CH" dirty="0"/>
+              <a:t> </a:t>
+            </a:r>
+            <a:r>
+              <a:rPr lang="de-CH" dirty="0" err="1"/>
+              <a:t>list</a:t>
+            </a:r>
+            <a:r>
+              <a:rPr lang="de-CH" dirty="0"/>
+              <a:t>.</a:t>
+            </a:r>
+          </a:p>
+          <a:p>
+            <a:r>
+              <a:rPr lang="de-CH" dirty="0"/>
+              <a:t>Both </a:t>
+            </a:r>
+            <a:r>
+              <a:rPr lang="de-CH" dirty="0" err="1"/>
+              <a:t>information</a:t>
+            </a:r>
+            <a:r>
+              <a:rPr lang="de-CH" dirty="0"/>
+              <a:t> </a:t>
+            </a:r>
+            <a:r>
+              <a:rPr lang="de-CH" dirty="0" err="1"/>
+              <a:t>is</a:t>
+            </a:r>
+            <a:r>
+              <a:rPr lang="de-CH" dirty="0"/>
+              <a:t> </a:t>
+            </a:r>
+            <a:r>
+              <a:rPr lang="de-CH" dirty="0" err="1"/>
+              <a:t>recieved</a:t>
+            </a:r>
+            <a:r>
+              <a:rPr lang="de-CH" dirty="0"/>
+              <a:t> </a:t>
+            </a:r>
+            <a:r>
+              <a:rPr lang="de-CH" dirty="0" err="1"/>
+              <a:t>by</a:t>
+            </a:r>
+            <a:r>
+              <a:rPr lang="de-CH" dirty="0"/>
+              <a:t> </a:t>
+            </a:r>
+            <a:r>
+              <a:rPr lang="de-CH" dirty="0" err="1"/>
+              <a:t>us</a:t>
+            </a:r>
+            <a:r>
+              <a:rPr lang="de-CH" dirty="0"/>
+              <a:t> with a </a:t>
+            </a:r>
+            <a:r>
+              <a:rPr lang="de-CH" dirty="0" err="1"/>
+              <a:t>stimuli</a:t>
+            </a:r>
+            <a:r>
+              <a:rPr lang="de-CH" dirty="0"/>
+              <a:t>, </a:t>
+            </a:r>
+            <a:r>
+              <a:rPr lang="de-CH" dirty="0" err="1"/>
+              <a:t>either</a:t>
+            </a:r>
+            <a:r>
+              <a:rPr lang="de-CH" dirty="0"/>
+              <a:t> </a:t>
+            </a:r>
+            <a:r>
+              <a:rPr lang="de-CH" dirty="0" err="1"/>
+              <a:t>the</a:t>
+            </a:r>
+            <a:r>
+              <a:rPr lang="de-CH" dirty="0"/>
+              <a:t> </a:t>
+            </a:r>
+            <a:r>
+              <a:rPr lang="de-CH" dirty="0" err="1"/>
+              <a:t>ear</a:t>
+            </a:r>
+            <a:r>
+              <a:rPr lang="de-CH" dirty="0"/>
+              <a:t> </a:t>
+            </a:r>
+            <a:r>
+              <a:rPr lang="de-CH" dirty="0" err="1"/>
+              <a:t>or</a:t>
+            </a:r>
+            <a:r>
+              <a:rPr lang="de-CH" dirty="0"/>
+              <a:t> </a:t>
+            </a:r>
+            <a:r>
+              <a:rPr lang="de-CH" dirty="0" err="1"/>
+              <a:t>our</a:t>
+            </a:r>
+            <a:r>
+              <a:rPr lang="de-CH" dirty="0"/>
+              <a:t> </a:t>
+            </a:r>
+            <a:r>
+              <a:rPr lang="de-CH" dirty="0" err="1"/>
+              <a:t>eyes</a:t>
+            </a:r>
+            <a:r>
+              <a:rPr lang="de-CH" dirty="0"/>
+              <a:t>. </a:t>
+            </a:r>
+          </a:p>
+        </p:txBody>
+      </p:sp>
+      <p:sp>
+        <p:nvSpPr>
+          <p:cNvPr id="4" name="Foliennummernplatzhalter 3"/>
+          <p:cNvSpPr>
+            <a:spLocks noGrp="1"/>
+          </p:cNvSpPr>
+          <p:nvPr>
+            <p:ph type="sldNum" sz="quarter" idx="5"/>
+          </p:nvPr>
+        </p:nvSpPr>
+        <p:spPr/>
+        <p:txBody>
+          <a:bodyPr/>
+          <a:lstStyle/>
+          <a:p>
+            <a:fld id="{F08A1825-D802-43E6-88CE-6E727D15DE22}" type="slidenum">
+              <a:rPr lang="de-CH" smtClean="0"/>
+              <a:t>4</a:t>
+            </a:fld>
+            <a:endParaRPr lang="de-CH"/>
+          </a:p>
+        </p:txBody>
+      </p:sp>
+    </p:spTree>
+    <p:extLst>
+      <p:ext uri="{BB962C8B-B14F-4D97-AF65-F5344CB8AC3E}">
+        <p14:creationId xmlns:p14="http://schemas.microsoft.com/office/powerpoint/2010/main" val="3505407939"/>
+      </p:ext>
+    </p:extLst>
+  </p:cSld>
+  <p:clrMapOvr>
+    <a:masterClrMapping/>
+  </p:clrMapOvr>
+</p:notes>
+</file>
+
+<file path=ppt/notesSlides/notesSlide4.xml><?xml version="1.0" encoding="utf-8"?>
+<p:notes xmlns:a="http://schemas.openxmlformats.org/drawingml/2006/main" xmlns:r="http://schemas.openxmlformats.org/officeDocument/2006/relationships" xmlns:p="http://schemas.openxmlformats.org/presentationml/2006/main">
+  <p:cSld>
+    <p:spTree>
+      <p:nvGrpSpPr>
+        <p:cNvPr id="1" name=""/>
+        <p:cNvGrpSpPr/>
+        <p:nvPr/>
+      </p:nvGrpSpPr>
+      <p:grpSpPr>
+        <a:xfrm>
+          <a:off x="0" y="0"/>
+          <a:ext cx="0" cy="0"/>
+          <a:chOff x="0" y="0"/>
+          <a:chExt cx="0" cy="0"/>
+        </a:xfrm>
+      </p:grpSpPr>
+      <p:sp>
+        <p:nvSpPr>
+          <p:cNvPr id="2" name="Folienbildplatzhalter 1"/>
+          <p:cNvSpPr>
+            <a:spLocks noGrp="1" noRot="1" noChangeAspect="1"/>
+          </p:cNvSpPr>
+          <p:nvPr>
+            <p:ph type="sldImg"/>
+          </p:nvPr>
+        </p:nvSpPr>
+        <p:spPr/>
+      </p:sp>
+      <p:sp>
+        <p:nvSpPr>
+          <p:cNvPr id="3" name="Notizenplatzhalter 2"/>
+          <p:cNvSpPr>
+            <a:spLocks noGrp="1"/>
+          </p:cNvSpPr>
+          <p:nvPr>
+            <p:ph type="body" idx="1"/>
+          </p:nvPr>
+        </p:nvSpPr>
+        <p:spPr/>
+        <p:txBody>
+          <a:bodyPr/>
+          <a:lstStyle/>
+          <a:p>
+            <a:r>
+              <a:rPr lang="de-CH" dirty="0"/>
+              <a:t>The </a:t>
+            </a:r>
+            <a:r>
+              <a:rPr lang="de-CH" dirty="0" err="1"/>
+              <a:t>information</a:t>
+            </a:r>
+            <a:r>
+              <a:rPr lang="de-CH" dirty="0"/>
+              <a:t> </a:t>
+            </a:r>
+            <a:r>
+              <a:rPr lang="de-CH" dirty="0" err="1"/>
+              <a:t>is</a:t>
+            </a:r>
+            <a:r>
+              <a:rPr lang="de-CH" dirty="0"/>
+              <a:t> </a:t>
+            </a:r>
+            <a:r>
+              <a:rPr lang="de-CH" dirty="0" err="1"/>
+              <a:t>transmitted</a:t>
+            </a:r>
+            <a:r>
+              <a:rPr lang="de-CH" dirty="0"/>
+              <a:t> </a:t>
+            </a:r>
+            <a:r>
+              <a:rPr lang="de-CH" dirty="0" err="1"/>
+              <a:t>by</a:t>
+            </a:r>
+            <a:r>
+              <a:rPr lang="de-CH" dirty="0"/>
+              <a:t> </a:t>
+            </a:r>
+            <a:r>
+              <a:rPr lang="de-CH" dirty="0" err="1"/>
+              <a:t>our</a:t>
+            </a:r>
+            <a:r>
+              <a:rPr lang="de-CH" dirty="0"/>
+              <a:t> </a:t>
+            </a:r>
+            <a:r>
+              <a:rPr lang="de-CH" dirty="0" err="1"/>
+              <a:t>nervous</a:t>
+            </a:r>
+            <a:r>
+              <a:rPr lang="de-CH" dirty="0"/>
+              <a:t> </a:t>
+            </a:r>
+            <a:r>
+              <a:rPr lang="de-CH" dirty="0" err="1"/>
+              <a:t>system</a:t>
+            </a:r>
+            <a:r>
+              <a:rPr lang="de-CH" dirty="0"/>
+              <a:t> </a:t>
+            </a:r>
+            <a:r>
+              <a:rPr lang="de-CH" dirty="0" err="1"/>
+              <a:t>to</a:t>
+            </a:r>
+            <a:r>
+              <a:rPr lang="de-CH" dirty="0"/>
+              <a:t> </a:t>
+            </a:r>
+            <a:r>
+              <a:rPr lang="de-CH" dirty="0" err="1"/>
+              <a:t>our</a:t>
+            </a:r>
+            <a:r>
+              <a:rPr lang="de-CH" dirty="0"/>
+              <a:t> </a:t>
+            </a:r>
+            <a:r>
+              <a:rPr lang="de-CH" dirty="0" err="1"/>
+              <a:t>brain</a:t>
+            </a:r>
+            <a:r>
+              <a:rPr lang="de-CH" dirty="0"/>
+              <a:t> and </a:t>
+            </a:r>
+            <a:r>
+              <a:rPr lang="de-CH" dirty="0" err="1"/>
+              <a:t>processed</a:t>
+            </a:r>
+            <a:r>
+              <a:rPr lang="de-CH" dirty="0"/>
+              <a:t> </a:t>
+            </a:r>
+            <a:r>
+              <a:rPr lang="de-CH" dirty="0" err="1"/>
+              <a:t>by</a:t>
+            </a:r>
+            <a:r>
+              <a:rPr lang="de-CH" dirty="0"/>
+              <a:t> it. </a:t>
+            </a:r>
+            <a:r>
+              <a:rPr lang="de-CH" dirty="0" err="1"/>
+              <a:t>We</a:t>
+            </a:r>
+            <a:r>
+              <a:rPr lang="de-CH" dirty="0"/>
+              <a:t> </a:t>
+            </a:r>
+            <a:r>
+              <a:rPr lang="de-CH" dirty="0" err="1"/>
+              <a:t>can</a:t>
+            </a:r>
+            <a:r>
+              <a:rPr lang="de-CH" dirty="0"/>
+              <a:t> </a:t>
+            </a:r>
+            <a:r>
+              <a:rPr lang="de-CH" dirty="0" err="1"/>
+              <a:t>see</a:t>
+            </a:r>
+            <a:r>
+              <a:rPr lang="de-CH" dirty="0"/>
+              <a:t>, </a:t>
+            </a:r>
+            <a:r>
+              <a:rPr lang="de-CH" dirty="0" err="1"/>
+              <a:t>that</a:t>
+            </a:r>
+            <a:r>
+              <a:rPr lang="de-CH" dirty="0"/>
+              <a:t> </a:t>
+            </a:r>
+            <a:r>
+              <a:rPr lang="de-CH" dirty="0" err="1"/>
+              <a:t>our</a:t>
+            </a:r>
+            <a:r>
+              <a:rPr lang="de-CH" dirty="0"/>
+              <a:t> </a:t>
+            </a:r>
+            <a:r>
+              <a:rPr lang="de-CH" dirty="0" err="1"/>
+              <a:t>brains</a:t>
+            </a:r>
+            <a:r>
+              <a:rPr lang="de-CH" dirty="0"/>
+              <a:t> </a:t>
+            </a:r>
+            <a:r>
+              <a:rPr lang="de-CH" dirty="0" err="1"/>
+              <a:t>process</a:t>
+            </a:r>
+            <a:r>
+              <a:rPr lang="de-CH" dirty="0"/>
+              <a:t> </a:t>
+            </a:r>
+            <a:r>
+              <a:rPr lang="de-CH" dirty="0" err="1"/>
+              <a:t>music</a:t>
+            </a:r>
+            <a:r>
+              <a:rPr lang="de-CH" dirty="0"/>
+              <a:t> and </a:t>
+            </a:r>
+            <a:r>
+              <a:rPr lang="de-CH" dirty="0" err="1"/>
+              <a:t>the</a:t>
+            </a:r>
+            <a:r>
+              <a:rPr lang="de-CH" dirty="0"/>
+              <a:t> written </a:t>
+            </a:r>
+            <a:r>
+              <a:rPr lang="de-CH" dirty="0" err="1"/>
+              <a:t>language</a:t>
+            </a:r>
+            <a:r>
+              <a:rPr lang="de-CH" dirty="0"/>
+              <a:t> in </a:t>
+            </a:r>
+            <a:r>
+              <a:rPr lang="de-CH" dirty="0" err="1"/>
+              <a:t>the</a:t>
+            </a:r>
+            <a:r>
+              <a:rPr lang="de-CH" dirty="0"/>
+              <a:t> same </a:t>
+            </a:r>
+            <a:r>
+              <a:rPr lang="de-CH" dirty="0" err="1"/>
+              <a:t>area</a:t>
+            </a:r>
+            <a:r>
+              <a:rPr lang="de-CH" dirty="0"/>
+              <a:t>, so </a:t>
+            </a:r>
+            <a:r>
+              <a:rPr lang="de-CH" dirty="0" err="1"/>
+              <a:t>there</a:t>
+            </a:r>
+            <a:r>
+              <a:rPr lang="de-CH" dirty="0"/>
+              <a:t> </a:t>
+            </a:r>
+            <a:r>
+              <a:rPr lang="de-CH" dirty="0" err="1"/>
+              <a:t>is</a:t>
+            </a:r>
+            <a:r>
+              <a:rPr lang="de-CH" dirty="0"/>
+              <a:t> a </a:t>
+            </a:r>
+            <a:r>
+              <a:rPr lang="de-CH" dirty="0" err="1"/>
+              <a:t>connection</a:t>
+            </a:r>
+            <a:r>
+              <a:rPr lang="de-CH" dirty="0"/>
+              <a:t> between </a:t>
+            </a:r>
+            <a:r>
+              <a:rPr lang="de-CH" dirty="0" err="1"/>
+              <a:t>music</a:t>
+            </a:r>
+            <a:r>
+              <a:rPr lang="de-CH" dirty="0"/>
+              <a:t> and written </a:t>
+            </a:r>
+            <a:r>
+              <a:rPr lang="de-CH" dirty="0" err="1"/>
+              <a:t>language</a:t>
+            </a:r>
+            <a:r>
+              <a:rPr lang="de-CH" dirty="0"/>
+              <a:t>. </a:t>
+            </a:r>
+            <a:r>
+              <a:rPr lang="de-CH" dirty="0" err="1"/>
+              <a:t>Especially</a:t>
+            </a:r>
+            <a:r>
+              <a:rPr lang="de-CH" dirty="0"/>
+              <a:t> </a:t>
+            </a:r>
+            <a:r>
+              <a:rPr lang="de-CH" dirty="0" err="1"/>
+              <a:t>if</a:t>
+            </a:r>
+            <a:r>
+              <a:rPr lang="de-CH" dirty="0"/>
+              <a:t> </a:t>
+            </a:r>
+            <a:r>
+              <a:rPr lang="de-CH" dirty="0" err="1"/>
+              <a:t>text</a:t>
+            </a:r>
+            <a:r>
+              <a:rPr lang="de-CH" dirty="0"/>
+              <a:t> </a:t>
+            </a:r>
+            <a:r>
+              <a:rPr lang="de-CH" dirty="0" err="1"/>
+              <a:t>is</a:t>
+            </a:r>
+            <a:r>
+              <a:rPr lang="de-CH" dirty="0"/>
+              <a:t> </a:t>
+            </a:r>
+            <a:r>
+              <a:rPr lang="de-CH" dirty="0" err="1"/>
+              <a:t>acossiated</a:t>
+            </a:r>
+            <a:r>
+              <a:rPr lang="de-CH" dirty="0"/>
+              <a:t> in </a:t>
+            </a:r>
+            <a:r>
+              <a:rPr lang="de-CH" dirty="0" err="1"/>
+              <a:t>the</a:t>
+            </a:r>
+            <a:r>
+              <a:rPr lang="de-CH" dirty="0"/>
+              <a:t> </a:t>
+            </a:r>
+            <a:r>
+              <a:rPr lang="de-CH" dirty="0" err="1"/>
+              <a:t>music</a:t>
+            </a:r>
+            <a:r>
+              <a:rPr lang="de-CH" dirty="0"/>
+              <a:t>, </a:t>
+            </a:r>
+            <a:r>
+              <a:rPr lang="de-CH" dirty="0" err="1"/>
+              <a:t>our</a:t>
+            </a:r>
+            <a:r>
+              <a:rPr lang="de-CH" dirty="0"/>
+              <a:t> </a:t>
+            </a:r>
+            <a:r>
+              <a:rPr lang="de-CH" dirty="0" err="1"/>
+              <a:t>brain</a:t>
+            </a:r>
+            <a:r>
+              <a:rPr lang="de-CH" dirty="0"/>
+              <a:t> processes </a:t>
+            </a:r>
+            <a:r>
+              <a:rPr lang="de-CH" dirty="0" err="1"/>
+              <a:t>the</a:t>
+            </a:r>
+            <a:r>
+              <a:rPr lang="de-CH" dirty="0"/>
+              <a:t> </a:t>
+            </a:r>
+            <a:r>
+              <a:rPr lang="de-CH" dirty="0" err="1"/>
+              <a:t>information</a:t>
+            </a:r>
+            <a:r>
+              <a:rPr lang="de-CH" dirty="0"/>
+              <a:t> in </a:t>
+            </a:r>
+            <a:r>
+              <a:rPr lang="de-CH" dirty="0" err="1"/>
+              <a:t>the</a:t>
+            </a:r>
+            <a:r>
+              <a:rPr lang="de-CH" dirty="0"/>
+              <a:t> same </a:t>
+            </a:r>
+            <a:r>
+              <a:rPr lang="de-CH" dirty="0" err="1"/>
+              <a:t>brain</a:t>
+            </a:r>
+            <a:r>
+              <a:rPr lang="de-CH" dirty="0"/>
+              <a:t> </a:t>
+            </a:r>
+            <a:r>
+              <a:rPr lang="de-CH" dirty="0" err="1"/>
+              <a:t>area</a:t>
+            </a:r>
+            <a:r>
+              <a:rPr lang="de-CH" dirty="0"/>
+              <a:t>.</a:t>
+            </a:r>
+          </a:p>
+          <a:p>
+            <a:endParaRPr lang="de-CH" dirty="0"/>
+          </a:p>
+          <a:p>
+            <a:r>
+              <a:rPr lang="de-CH" dirty="0"/>
+              <a:t>This </a:t>
+            </a:r>
+            <a:r>
+              <a:rPr lang="de-CH" dirty="0" err="1"/>
+              <a:t>information</a:t>
+            </a:r>
+            <a:r>
+              <a:rPr lang="de-CH" dirty="0"/>
+              <a:t> </a:t>
+            </a:r>
+            <a:r>
+              <a:rPr lang="de-CH" dirty="0" err="1"/>
+              <a:t>is</a:t>
+            </a:r>
+            <a:r>
+              <a:rPr lang="de-CH" dirty="0"/>
+              <a:t> </a:t>
+            </a:r>
+            <a:r>
+              <a:rPr lang="de-CH" dirty="0" err="1"/>
+              <a:t>associated</a:t>
+            </a:r>
+            <a:r>
+              <a:rPr lang="de-CH" dirty="0"/>
+              <a:t> with </a:t>
+            </a:r>
+            <a:r>
+              <a:rPr lang="de-CH" dirty="0" err="1"/>
+              <a:t>geography</a:t>
+            </a:r>
+            <a:r>
+              <a:rPr lang="de-CH" dirty="0"/>
+              <a:t> and </a:t>
+            </a:r>
+            <a:r>
+              <a:rPr lang="de-CH" dirty="0" err="1"/>
+              <a:t>our</a:t>
+            </a:r>
+            <a:r>
+              <a:rPr lang="de-CH" dirty="0"/>
+              <a:t> </a:t>
+            </a:r>
+            <a:r>
+              <a:rPr lang="de-CH" dirty="0" err="1"/>
+              <a:t>world</a:t>
+            </a:r>
+            <a:r>
+              <a:rPr lang="de-CH" dirty="0"/>
+              <a:t> </a:t>
+            </a:r>
+            <a:r>
+              <a:rPr lang="de-CH" dirty="0" err="1"/>
+              <a:t>we</a:t>
+            </a:r>
+            <a:r>
+              <a:rPr lang="de-CH" dirty="0"/>
+              <a:t> live in. So in </a:t>
+            </a:r>
+            <a:r>
+              <a:rPr lang="de-CH" dirty="0" err="1"/>
+              <a:t>this</a:t>
+            </a:r>
+            <a:r>
+              <a:rPr lang="de-CH" dirty="0"/>
+              <a:t> </a:t>
+            </a:r>
+            <a:r>
+              <a:rPr lang="de-CH" dirty="0" err="1"/>
+              <a:t>example</a:t>
+            </a:r>
+            <a:r>
+              <a:rPr lang="de-CH" dirty="0"/>
+              <a:t> </a:t>
+            </a:r>
+            <a:r>
+              <a:rPr lang="de-CH" dirty="0" err="1"/>
+              <a:t>we</a:t>
+            </a:r>
+            <a:r>
+              <a:rPr lang="de-CH" dirty="0"/>
+              <a:t> </a:t>
+            </a:r>
+            <a:r>
+              <a:rPr lang="de-CH" dirty="0" err="1"/>
+              <a:t>can</a:t>
+            </a:r>
+            <a:r>
+              <a:rPr lang="de-CH" dirty="0"/>
+              <a:t> </a:t>
+            </a:r>
+            <a:r>
+              <a:rPr lang="de-CH" dirty="0" err="1"/>
+              <a:t>see</a:t>
+            </a:r>
+            <a:r>
+              <a:rPr lang="de-CH" dirty="0"/>
+              <a:t>, why </a:t>
+            </a:r>
+            <a:r>
+              <a:rPr lang="de-CH" dirty="0" err="1"/>
+              <a:t>music</a:t>
+            </a:r>
+            <a:r>
+              <a:rPr lang="de-CH" dirty="0"/>
+              <a:t> and </a:t>
+            </a:r>
+            <a:r>
+              <a:rPr lang="de-CH" dirty="0" err="1"/>
+              <a:t>text</a:t>
+            </a:r>
+            <a:r>
+              <a:rPr lang="de-CH" dirty="0"/>
+              <a:t> based </a:t>
+            </a:r>
+            <a:r>
+              <a:rPr lang="de-CH" dirty="0" err="1"/>
+              <a:t>geography</a:t>
+            </a:r>
+            <a:r>
+              <a:rPr lang="de-CH" dirty="0"/>
+              <a:t> </a:t>
+            </a:r>
+            <a:r>
+              <a:rPr lang="de-CH" dirty="0" err="1"/>
+              <a:t>retreval</a:t>
+            </a:r>
+            <a:r>
+              <a:rPr lang="de-CH" dirty="0"/>
+              <a:t> </a:t>
+            </a:r>
+            <a:r>
+              <a:rPr lang="de-CH" dirty="0" err="1"/>
+              <a:t>is</a:t>
+            </a:r>
+            <a:r>
+              <a:rPr lang="de-CH" dirty="0"/>
+              <a:t> </a:t>
+            </a:r>
+            <a:r>
+              <a:rPr lang="de-CH" dirty="0" err="1"/>
+              <a:t>quite</a:t>
+            </a:r>
+            <a:r>
+              <a:rPr lang="de-CH" dirty="0"/>
+              <a:t> </a:t>
+            </a:r>
+            <a:r>
+              <a:rPr lang="de-CH" dirty="0" err="1"/>
+              <a:t>simmilar</a:t>
+            </a:r>
+            <a:r>
+              <a:rPr lang="de-CH" dirty="0"/>
+              <a:t>. </a:t>
+            </a:r>
+          </a:p>
+          <a:p>
+            <a:endParaRPr lang="de-CH" dirty="0"/>
+          </a:p>
+          <a:p>
+            <a:r>
+              <a:rPr lang="de-CH" dirty="0" err="1"/>
+              <a:t>Now</a:t>
+            </a:r>
+            <a:r>
+              <a:rPr lang="de-CH" dirty="0"/>
+              <a:t> I </a:t>
+            </a:r>
+            <a:r>
+              <a:rPr lang="de-CH" dirty="0" err="1"/>
+              <a:t>want</a:t>
+            </a:r>
+            <a:r>
+              <a:rPr lang="de-CH" dirty="0"/>
+              <a:t> </a:t>
+            </a:r>
+            <a:r>
+              <a:rPr lang="de-CH" dirty="0" err="1"/>
+              <a:t>to</a:t>
+            </a:r>
+            <a:r>
+              <a:rPr lang="de-CH" dirty="0"/>
+              <a:t> </a:t>
+            </a:r>
+            <a:r>
+              <a:rPr lang="de-CH" dirty="0" err="1"/>
+              <a:t>quickly</a:t>
+            </a:r>
+            <a:r>
+              <a:rPr lang="de-CH" dirty="0"/>
+              <a:t> </a:t>
+            </a:r>
+            <a:r>
+              <a:rPr lang="de-CH" dirty="0" err="1"/>
+              <a:t>explain</a:t>
+            </a:r>
+            <a:r>
+              <a:rPr lang="de-CH" dirty="0"/>
+              <a:t> </a:t>
+            </a:r>
+            <a:r>
+              <a:rPr lang="de-CH" dirty="0" err="1"/>
+              <a:t>my</a:t>
+            </a:r>
+            <a:r>
+              <a:rPr lang="de-CH" dirty="0"/>
+              <a:t> </a:t>
+            </a:r>
+            <a:r>
+              <a:rPr lang="de-CH" dirty="0" err="1"/>
+              <a:t>approach</a:t>
+            </a:r>
+            <a:r>
+              <a:rPr lang="de-CH" dirty="0"/>
+              <a:t> </a:t>
+            </a:r>
+            <a:r>
+              <a:rPr lang="de-CH" dirty="0" err="1"/>
+              <a:t>to</a:t>
+            </a:r>
+            <a:r>
+              <a:rPr lang="de-CH" dirty="0"/>
+              <a:t> </a:t>
+            </a:r>
+            <a:r>
+              <a:rPr lang="de-CH" dirty="0" err="1"/>
+              <a:t>archieve</a:t>
+            </a:r>
+            <a:r>
+              <a:rPr lang="de-CH" dirty="0"/>
+              <a:t> </a:t>
+            </a:r>
+            <a:r>
+              <a:rPr lang="de-CH" dirty="0" err="1"/>
+              <a:t>the</a:t>
+            </a:r>
+            <a:r>
+              <a:rPr lang="de-CH" dirty="0"/>
+              <a:t> </a:t>
+            </a:r>
+            <a:r>
+              <a:rPr lang="de-CH" dirty="0" err="1"/>
+              <a:t>research</a:t>
+            </a:r>
+            <a:r>
+              <a:rPr lang="de-CH" dirty="0"/>
+              <a:t> </a:t>
+            </a:r>
+            <a:r>
+              <a:rPr lang="de-CH" dirty="0" err="1"/>
+              <a:t>question</a:t>
+            </a:r>
+            <a:r>
+              <a:rPr lang="de-CH" dirty="0"/>
+              <a:t>.</a:t>
+            </a:r>
+          </a:p>
+        </p:txBody>
+      </p:sp>
+      <p:sp>
+        <p:nvSpPr>
+          <p:cNvPr id="4" name="Foliennummernplatzhalter 3"/>
+          <p:cNvSpPr>
+            <a:spLocks noGrp="1"/>
+          </p:cNvSpPr>
+          <p:nvPr>
+            <p:ph type="sldNum" sz="quarter" idx="5"/>
+          </p:nvPr>
+        </p:nvSpPr>
+        <p:spPr/>
+        <p:txBody>
+          <a:bodyPr/>
+          <a:lstStyle/>
+          <a:p>
+            <a:fld id="{F08A1825-D802-43E6-88CE-6E727D15DE22}" type="slidenum">
+              <a:rPr lang="de-CH" smtClean="0"/>
+              <a:t>5</a:t>
+            </a:fld>
+            <a:endParaRPr lang="de-CH"/>
+          </a:p>
+        </p:txBody>
+      </p:sp>
+    </p:spTree>
+    <p:extLst>
+      <p:ext uri="{BB962C8B-B14F-4D97-AF65-F5344CB8AC3E}">
+        <p14:creationId xmlns:p14="http://schemas.microsoft.com/office/powerpoint/2010/main" val="1998742654"/>
+      </p:ext>
+    </p:extLst>
+  </p:cSld>
+  <p:clrMapOvr>
+    <a:masterClrMapping/>
+  </p:clrMapOvr>
+</p:notes>
+</file>
+
+<file path=ppt/notesSlides/notesSlide5.xml><?xml version="1.0" encoding="utf-8"?>
+<p:notes xmlns:a="http://schemas.openxmlformats.org/drawingml/2006/main" xmlns:r="http://schemas.openxmlformats.org/officeDocument/2006/relationships" xmlns:p="http://schemas.openxmlformats.org/presentationml/2006/main">
+  <p:cSld>
+    <p:spTree>
+      <p:nvGrpSpPr>
+        <p:cNvPr id="1" name=""/>
+        <p:cNvGrpSpPr/>
+        <p:nvPr/>
+      </p:nvGrpSpPr>
+      <p:grpSpPr>
+        <a:xfrm>
+          <a:off x="0" y="0"/>
+          <a:ext cx="0" cy="0"/>
+          <a:chOff x="0" y="0"/>
+          <a:chExt cx="0" cy="0"/>
+        </a:xfrm>
+      </p:grpSpPr>
+      <p:sp>
+        <p:nvSpPr>
+          <p:cNvPr id="2" name="Folienbildplatzhalter 1"/>
+          <p:cNvSpPr>
+            <a:spLocks noGrp="1" noRot="1" noChangeAspect="1"/>
+          </p:cNvSpPr>
+          <p:nvPr>
+            <p:ph type="sldImg"/>
+          </p:nvPr>
+        </p:nvSpPr>
+        <p:spPr/>
+      </p:sp>
+      <p:sp>
+        <p:nvSpPr>
+          <p:cNvPr id="3" name="Notizenplatzhalter 2"/>
+          <p:cNvSpPr>
+            <a:spLocks noGrp="1"/>
+          </p:cNvSpPr>
+          <p:nvPr>
+            <p:ph type="body" idx="1"/>
+          </p:nvPr>
+        </p:nvSpPr>
+        <p:spPr/>
+        <p:txBody>
+          <a:bodyPr/>
+          <a:lstStyle/>
+          <a:p>
+            <a:r>
+              <a:rPr lang="de-CH" dirty="0"/>
+              <a:t>First I </a:t>
+            </a:r>
+            <a:r>
+              <a:rPr lang="de-CH" dirty="0" err="1"/>
+              <a:t>retrieve</a:t>
+            </a:r>
+            <a:r>
+              <a:rPr lang="de-CH" dirty="0"/>
+              <a:t> </a:t>
+            </a:r>
+            <a:r>
+              <a:rPr lang="de-CH" dirty="0" err="1"/>
+              <a:t>the</a:t>
+            </a:r>
+            <a:r>
+              <a:rPr lang="de-CH" dirty="0"/>
+              <a:t> </a:t>
+            </a:r>
+            <a:r>
+              <a:rPr lang="de-CH" dirty="0" err="1"/>
+              <a:t>data</a:t>
+            </a:r>
+            <a:r>
+              <a:rPr lang="de-CH" dirty="0"/>
+              <a:t> from </a:t>
+            </a:r>
+            <a:r>
+              <a:rPr lang="de-CH" dirty="0" err="1"/>
+              <a:t>the</a:t>
+            </a:r>
+            <a:r>
+              <a:rPr lang="de-CH" dirty="0"/>
+              <a:t> </a:t>
+            </a:r>
+            <a:r>
+              <a:rPr lang="de-CH" dirty="0" err="1"/>
+              <a:t>irvine</a:t>
+            </a:r>
+            <a:r>
+              <a:rPr lang="de-CH" dirty="0"/>
+              <a:t> machine </a:t>
+            </a:r>
+            <a:r>
+              <a:rPr lang="de-CH" dirty="0" err="1"/>
+              <a:t>learning</a:t>
+            </a:r>
+            <a:r>
+              <a:rPr lang="de-CH" dirty="0"/>
+              <a:t> </a:t>
+            </a:r>
+            <a:r>
+              <a:rPr lang="de-CH" dirty="0" err="1"/>
+              <a:t>repository</a:t>
+            </a:r>
+            <a:r>
+              <a:rPr lang="de-CH" dirty="0"/>
+              <a:t>, then do a </a:t>
+            </a:r>
+            <a:r>
+              <a:rPr lang="de-CH" dirty="0" err="1"/>
+              <a:t>exploratory</a:t>
+            </a:r>
+            <a:r>
+              <a:rPr lang="de-CH" dirty="0"/>
+              <a:t> </a:t>
+            </a:r>
+            <a:r>
+              <a:rPr lang="de-CH" dirty="0" err="1"/>
+              <a:t>data</a:t>
+            </a:r>
+            <a:r>
+              <a:rPr lang="de-CH" dirty="0"/>
+              <a:t> </a:t>
+            </a:r>
+            <a:r>
+              <a:rPr lang="de-CH" dirty="0" err="1"/>
+              <a:t>analysis</a:t>
+            </a:r>
+            <a:r>
+              <a:rPr lang="de-CH" dirty="0"/>
+              <a:t> </a:t>
+            </a:r>
+            <a:r>
+              <a:rPr lang="de-CH" dirty="0" err="1"/>
+              <a:t>to</a:t>
+            </a:r>
+            <a:r>
+              <a:rPr lang="de-CH" dirty="0"/>
+              <a:t> get </a:t>
+            </a:r>
+            <a:r>
+              <a:rPr lang="de-CH" dirty="0" err="1"/>
+              <a:t>know</a:t>
+            </a:r>
+            <a:r>
+              <a:rPr lang="de-CH" dirty="0"/>
+              <a:t> </a:t>
+            </a:r>
+            <a:r>
+              <a:rPr lang="de-CH" dirty="0" err="1"/>
+              <a:t>the</a:t>
+            </a:r>
+            <a:r>
+              <a:rPr lang="de-CH" dirty="0"/>
+              <a:t> </a:t>
+            </a:r>
+            <a:r>
+              <a:rPr lang="de-CH" dirty="0" err="1"/>
+              <a:t>data</a:t>
+            </a:r>
+            <a:r>
+              <a:rPr lang="de-CH" dirty="0"/>
+              <a:t>. After </a:t>
+            </a:r>
+            <a:r>
+              <a:rPr lang="de-CH" dirty="0" err="1"/>
+              <a:t>further</a:t>
+            </a:r>
+            <a:r>
+              <a:rPr lang="de-CH" dirty="0"/>
+              <a:t> </a:t>
+            </a:r>
+            <a:r>
+              <a:rPr lang="de-CH" dirty="0" err="1"/>
+              <a:t>processing</a:t>
+            </a:r>
+            <a:r>
+              <a:rPr lang="de-CH" dirty="0"/>
+              <a:t> i </a:t>
+            </a:r>
+            <a:r>
+              <a:rPr lang="de-CH" dirty="0" err="1"/>
+              <a:t>cluster</a:t>
+            </a:r>
+            <a:r>
+              <a:rPr lang="de-CH" dirty="0"/>
+              <a:t> </a:t>
+            </a:r>
+            <a:r>
+              <a:rPr lang="de-CH" dirty="0" err="1"/>
+              <a:t>the</a:t>
+            </a:r>
+            <a:r>
+              <a:rPr lang="de-CH" dirty="0"/>
+              <a:t> </a:t>
+            </a:r>
+            <a:r>
+              <a:rPr lang="de-CH" dirty="0" err="1"/>
+              <a:t>data</a:t>
+            </a:r>
+            <a:r>
+              <a:rPr lang="de-CH" dirty="0"/>
+              <a:t>, </a:t>
+            </a:r>
+            <a:r>
+              <a:rPr lang="de-CH" dirty="0" err="1"/>
+              <a:t>train</a:t>
+            </a:r>
+            <a:r>
+              <a:rPr lang="de-CH" dirty="0"/>
+              <a:t> </a:t>
+            </a:r>
+            <a:r>
+              <a:rPr lang="de-CH" dirty="0" err="1"/>
+              <a:t>the</a:t>
+            </a:r>
+            <a:r>
+              <a:rPr lang="de-CH" dirty="0"/>
+              <a:t> </a:t>
+            </a:r>
+            <a:r>
+              <a:rPr lang="de-CH" dirty="0" err="1"/>
+              <a:t>data</a:t>
+            </a:r>
+            <a:r>
+              <a:rPr lang="de-CH" dirty="0"/>
+              <a:t> and get </a:t>
+            </a:r>
+            <a:r>
+              <a:rPr lang="de-CH" dirty="0" err="1"/>
+              <a:t>the</a:t>
+            </a:r>
+            <a:r>
+              <a:rPr lang="de-CH" dirty="0"/>
+              <a:t> results from </a:t>
+            </a:r>
+            <a:r>
+              <a:rPr lang="de-CH" dirty="0" err="1"/>
+              <a:t>the</a:t>
+            </a:r>
+            <a:r>
+              <a:rPr lang="de-CH" dirty="0"/>
+              <a:t> machine </a:t>
+            </a:r>
+            <a:r>
+              <a:rPr lang="de-CH" dirty="0" err="1"/>
+              <a:t>learning</a:t>
+            </a:r>
+            <a:r>
+              <a:rPr lang="de-CH" dirty="0"/>
+              <a:t> </a:t>
+            </a:r>
+            <a:r>
+              <a:rPr lang="de-CH" dirty="0" err="1"/>
+              <a:t>method</a:t>
+            </a:r>
+            <a:r>
+              <a:rPr lang="de-CH" dirty="0"/>
+              <a:t>. </a:t>
+            </a:r>
+            <a:r>
+              <a:rPr lang="de-CH" dirty="0" err="1"/>
+              <a:t>If</a:t>
+            </a:r>
+            <a:r>
+              <a:rPr lang="de-CH" dirty="0"/>
+              <a:t> </a:t>
+            </a:r>
+            <a:r>
+              <a:rPr lang="de-CH" dirty="0" err="1"/>
+              <a:t>the</a:t>
+            </a:r>
+            <a:r>
+              <a:rPr lang="de-CH" dirty="0"/>
+              <a:t> result </a:t>
+            </a:r>
+            <a:r>
+              <a:rPr lang="de-CH" dirty="0" err="1"/>
+              <a:t>does</a:t>
+            </a:r>
+            <a:r>
+              <a:rPr lang="de-CH" dirty="0"/>
+              <a:t> not </a:t>
+            </a:r>
+            <a:r>
+              <a:rPr lang="de-CH" dirty="0" err="1"/>
+              <a:t>satisfy</a:t>
+            </a:r>
+            <a:r>
+              <a:rPr lang="de-CH" dirty="0"/>
+              <a:t> </a:t>
+            </a:r>
+            <a:r>
+              <a:rPr lang="de-CH" dirty="0" err="1"/>
+              <a:t>me</a:t>
+            </a:r>
+            <a:r>
+              <a:rPr lang="de-CH" dirty="0"/>
+              <a:t>, i will </a:t>
+            </a:r>
+            <a:r>
+              <a:rPr lang="de-CH" dirty="0" err="1"/>
+              <a:t>implement</a:t>
+            </a:r>
+            <a:r>
+              <a:rPr lang="de-CH" dirty="0"/>
+              <a:t> </a:t>
+            </a:r>
+            <a:r>
+              <a:rPr lang="de-CH" dirty="0" err="1"/>
+              <a:t>new</a:t>
+            </a:r>
+            <a:r>
+              <a:rPr lang="de-CH" dirty="0"/>
+              <a:t> </a:t>
+            </a:r>
+            <a:r>
+              <a:rPr lang="de-CH" dirty="0" err="1"/>
+              <a:t>ways</a:t>
+            </a:r>
+            <a:r>
+              <a:rPr lang="de-CH" dirty="0"/>
+              <a:t> </a:t>
+            </a:r>
+            <a:r>
+              <a:rPr lang="de-CH" dirty="0" err="1"/>
+              <a:t>of</a:t>
+            </a:r>
+            <a:r>
+              <a:rPr lang="de-CH" dirty="0"/>
+              <a:t> </a:t>
+            </a:r>
+            <a:r>
+              <a:rPr lang="de-CH" dirty="0" err="1"/>
+              <a:t>processing</a:t>
+            </a:r>
+            <a:r>
+              <a:rPr lang="de-CH" dirty="0"/>
+              <a:t> </a:t>
+            </a:r>
+            <a:r>
+              <a:rPr lang="de-CH" dirty="0" err="1"/>
+              <a:t>or</a:t>
+            </a:r>
+            <a:r>
+              <a:rPr lang="de-CH" dirty="0"/>
+              <a:t> </a:t>
+            </a:r>
+            <a:r>
+              <a:rPr lang="de-CH" dirty="0" err="1"/>
+              <a:t>learning</a:t>
+            </a:r>
+            <a:r>
+              <a:rPr lang="de-CH" dirty="0"/>
+              <a:t>, such </a:t>
+            </a:r>
+            <a:r>
+              <a:rPr lang="de-CH" dirty="0" err="1"/>
+              <a:t>as</a:t>
+            </a:r>
+            <a:r>
+              <a:rPr lang="de-CH" dirty="0"/>
+              <a:t> </a:t>
+            </a:r>
+            <a:r>
+              <a:rPr lang="de-CH" dirty="0" err="1"/>
+              <a:t>the</a:t>
+            </a:r>
+            <a:r>
+              <a:rPr lang="de-CH" dirty="0"/>
+              <a:t> PCA </a:t>
+            </a:r>
+            <a:r>
+              <a:rPr lang="de-CH" dirty="0" err="1"/>
+              <a:t>or</a:t>
+            </a:r>
+            <a:r>
+              <a:rPr lang="de-CH" dirty="0"/>
+              <a:t> SMOTE </a:t>
+            </a:r>
+            <a:r>
+              <a:rPr lang="de-CH" dirty="0" err="1"/>
+              <a:t>method</a:t>
+            </a:r>
+            <a:r>
+              <a:rPr lang="de-CH" dirty="0"/>
+              <a:t>.</a:t>
+            </a:r>
+          </a:p>
+          <a:p>
+            <a:endParaRPr lang="de-CH" dirty="0"/>
+          </a:p>
+          <a:p>
+            <a:r>
+              <a:rPr lang="de-CH" dirty="0"/>
+              <a:t>At </a:t>
+            </a:r>
+            <a:r>
+              <a:rPr lang="de-CH" dirty="0" err="1"/>
+              <a:t>the</a:t>
+            </a:r>
+            <a:r>
+              <a:rPr lang="de-CH" dirty="0"/>
+              <a:t> </a:t>
+            </a:r>
+            <a:r>
+              <a:rPr lang="de-CH" dirty="0" err="1"/>
+              <a:t>moment</a:t>
+            </a:r>
+            <a:r>
+              <a:rPr lang="de-CH" dirty="0"/>
+              <a:t>, </a:t>
+            </a:r>
+            <a:r>
+              <a:rPr lang="de-CH" dirty="0" err="1"/>
+              <a:t>the</a:t>
+            </a:r>
+            <a:r>
+              <a:rPr lang="de-CH" dirty="0"/>
+              <a:t> </a:t>
+            </a:r>
+            <a:r>
+              <a:rPr lang="de-CH" dirty="0" err="1"/>
+              <a:t>accuracy</a:t>
+            </a:r>
+            <a:r>
+              <a:rPr lang="de-CH" dirty="0"/>
+              <a:t> score </a:t>
+            </a:r>
+            <a:r>
+              <a:rPr lang="de-CH" dirty="0" err="1"/>
+              <a:t>is</a:t>
+            </a:r>
+            <a:r>
+              <a:rPr lang="de-CH" dirty="0"/>
+              <a:t> </a:t>
+            </a:r>
+            <a:r>
+              <a:rPr lang="de-CH" dirty="0" err="1"/>
+              <a:t>around</a:t>
+            </a:r>
+            <a:r>
+              <a:rPr lang="de-CH" dirty="0"/>
+              <a:t> 0.45, which </a:t>
+            </a:r>
+            <a:r>
+              <a:rPr lang="de-CH" dirty="0" err="1"/>
+              <a:t>does</a:t>
+            </a:r>
+            <a:r>
+              <a:rPr lang="de-CH" dirty="0"/>
+              <a:t> not </a:t>
+            </a:r>
+            <a:r>
+              <a:rPr lang="de-CH" dirty="0" err="1"/>
+              <a:t>satisfy</a:t>
+            </a:r>
+            <a:r>
+              <a:rPr lang="de-CH" dirty="0"/>
+              <a:t> me. I will </a:t>
+            </a:r>
+            <a:r>
+              <a:rPr lang="de-CH" dirty="0" err="1"/>
+              <a:t>try</a:t>
+            </a:r>
+            <a:r>
+              <a:rPr lang="de-CH" dirty="0"/>
+              <a:t> </a:t>
+            </a:r>
+            <a:r>
+              <a:rPr lang="de-CH" dirty="0" err="1"/>
+              <a:t>to</a:t>
+            </a:r>
+            <a:r>
+              <a:rPr lang="de-CH" dirty="0"/>
+              <a:t> </a:t>
+            </a:r>
+            <a:r>
+              <a:rPr lang="de-CH" dirty="0" err="1"/>
+              <a:t>archieve</a:t>
+            </a:r>
+            <a:r>
+              <a:rPr lang="de-CH" dirty="0"/>
+              <a:t> a </a:t>
+            </a:r>
+            <a:r>
+              <a:rPr lang="de-CH" dirty="0" err="1"/>
+              <a:t>accuracy</a:t>
+            </a:r>
+            <a:r>
+              <a:rPr lang="de-CH" dirty="0"/>
+              <a:t> score </a:t>
+            </a:r>
+            <a:r>
+              <a:rPr lang="de-CH" dirty="0" err="1"/>
+              <a:t>of</a:t>
+            </a:r>
+            <a:r>
+              <a:rPr lang="de-CH" dirty="0"/>
+              <a:t> 0.7, which </a:t>
+            </a:r>
+            <a:r>
+              <a:rPr lang="de-CH" dirty="0" err="1"/>
+              <a:t>indicates</a:t>
+            </a:r>
+            <a:r>
+              <a:rPr lang="de-CH" dirty="0"/>
+              <a:t>, </a:t>
+            </a:r>
+            <a:r>
+              <a:rPr lang="de-CH" dirty="0" err="1"/>
+              <a:t>that</a:t>
+            </a:r>
+            <a:r>
+              <a:rPr lang="de-CH" dirty="0"/>
+              <a:t> 70% </a:t>
+            </a:r>
+            <a:r>
+              <a:rPr lang="de-CH" dirty="0" err="1"/>
+              <a:t>of</a:t>
+            </a:r>
+            <a:r>
+              <a:rPr lang="de-CH" dirty="0"/>
+              <a:t> </a:t>
+            </a:r>
+            <a:r>
+              <a:rPr lang="de-CH" dirty="0" err="1"/>
+              <a:t>the</a:t>
+            </a:r>
+            <a:r>
+              <a:rPr lang="de-CH" dirty="0"/>
+              <a:t> </a:t>
+            </a:r>
+            <a:r>
+              <a:rPr lang="de-CH" dirty="0" err="1"/>
+              <a:t>data</a:t>
+            </a:r>
+            <a:r>
+              <a:rPr lang="de-CH" dirty="0"/>
+              <a:t> will </a:t>
+            </a:r>
+            <a:r>
+              <a:rPr lang="de-CH" dirty="0" err="1"/>
+              <a:t>be</a:t>
+            </a:r>
+            <a:r>
+              <a:rPr lang="de-CH" dirty="0"/>
+              <a:t> </a:t>
+            </a:r>
+            <a:r>
+              <a:rPr lang="de-CH" dirty="0" err="1"/>
+              <a:t>correctly</a:t>
+            </a:r>
+            <a:r>
+              <a:rPr lang="de-CH" dirty="0"/>
+              <a:t> </a:t>
+            </a:r>
+            <a:r>
+              <a:rPr lang="de-CH" dirty="0" err="1"/>
+              <a:t>classified</a:t>
+            </a:r>
+            <a:r>
+              <a:rPr lang="de-CH" dirty="0"/>
+              <a:t>.</a:t>
+            </a:r>
+          </a:p>
+          <a:p>
+            <a:endParaRPr lang="de-CH" dirty="0"/>
+          </a:p>
+          <a:p>
+            <a:r>
+              <a:rPr lang="de-CH" dirty="0"/>
+              <a:t>I </a:t>
+            </a:r>
+            <a:r>
+              <a:rPr lang="de-CH" dirty="0" err="1"/>
+              <a:t>hope</a:t>
+            </a:r>
+            <a:r>
+              <a:rPr lang="de-CH" dirty="0"/>
+              <a:t> i </a:t>
+            </a:r>
+            <a:r>
+              <a:rPr lang="de-CH" dirty="0" err="1"/>
+              <a:t>can</a:t>
+            </a:r>
+            <a:r>
+              <a:rPr lang="de-CH" dirty="0"/>
+              <a:t> </a:t>
+            </a:r>
+            <a:r>
+              <a:rPr lang="de-CH" dirty="0" err="1"/>
+              <a:t>successfully</a:t>
+            </a:r>
+            <a:r>
+              <a:rPr lang="de-CH" dirty="0"/>
+              <a:t> </a:t>
+            </a:r>
+            <a:r>
+              <a:rPr lang="de-CH" dirty="0" err="1"/>
+              <a:t>implement</a:t>
+            </a:r>
+            <a:r>
+              <a:rPr lang="de-CH" dirty="0"/>
+              <a:t> </a:t>
+            </a:r>
+            <a:r>
+              <a:rPr lang="de-CH" dirty="0" err="1"/>
+              <a:t>my</a:t>
+            </a:r>
+            <a:r>
+              <a:rPr lang="de-CH" dirty="0"/>
+              <a:t> </a:t>
+            </a:r>
+            <a:r>
+              <a:rPr lang="de-CH" dirty="0" err="1"/>
+              <a:t>ideas</a:t>
+            </a:r>
+            <a:r>
+              <a:rPr lang="de-CH" dirty="0"/>
+              <a:t> and </a:t>
+            </a:r>
+            <a:r>
+              <a:rPr lang="de-CH" dirty="0" err="1"/>
+              <a:t>archieve</a:t>
+            </a:r>
+            <a:r>
+              <a:rPr lang="de-CH" dirty="0"/>
+              <a:t> a good </a:t>
+            </a:r>
+            <a:r>
+              <a:rPr lang="de-CH" dirty="0" err="1"/>
+              <a:t>classification</a:t>
+            </a:r>
+            <a:r>
+              <a:rPr lang="de-CH" dirty="0"/>
+              <a:t> fit.</a:t>
+            </a:r>
+          </a:p>
+        </p:txBody>
+      </p:sp>
+      <p:sp>
+        <p:nvSpPr>
+          <p:cNvPr id="4" name="Foliennummernplatzhalter 3"/>
+          <p:cNvSpPr>
+            <a:spLocks noGrp="1"/>
+          </p:cNvSpPr>
+          <p:nvPr>
+            <p:ph type="sldNum" sz="quarter" idx="5"/>
+          </p:nvPr>
+        </p:nvSpPr>
+        <p:spPr/>
+        <p:txBody>
+          <a:bodyPr/>
+          <a:lstStyle/>
+          <a:p>
+            <a:fld id="{F08A1825-D802-43E6-88CE-6E727D15DE22}" type="slidenum">
+              <a:rPr lang="de-CH" smtClean="0"/>
+              <a:t>6</a:t>
+            </a:fld>
+            <a:endParaRPr lang="de-CH"/>
+          </a:p>
+        </p:txBody>
+      </p:sp>
+    </p:spTree>
+    <p:extLst>
+      <p:ext uri="{BB962C8B-B14F-4D97-AF65-F5344CB8AC3E}">
+        <p14:creationId xmlns:p14="http://schemas.microsoft.com/office/powerpoint/2010/main" val="220165260"/>
+      </p:ext>
+    </p:extLst>
+  </p:cSld>
+  <p:clrMapOvr>
+    <a:masterClrMapping/>
+  </p:clrMapOvr>
+</p:notes>
+</file>
+
+<file path=ppt/notesSlides/notesSlide6.xml><?xml version="1.0" encoding="utf-8"?>
+<p:notes xmlns:a="http://schemas.openxmlformats.org/drawingml/2006/main" xmlns:r="http://schemas.openxmlformats.org/officeDocument/2006/relationships" xmlns:p="http://schemas.openxmlformats.org/presentationml/2006/main">
+  <p:cSld>
+    <p:spTree>
+      <p:nvGrpSpPr>
+        <p:cNvPr id="1" name=""/>
+        <p:cNvGrpSpPr/>
+        <p:nvPr/>
+      </p:nvGrpSpPr>
+      <p:grpSpPr>
+        <a:xfrm>
+          <a:off x="0" y="0"/>
+          <a:ext cx="0" cy="0"/>
+          <a:chOff x="0" y="0"/>
+          <a:chExt cx="0" cy="0"/>
+        </a:xfrm>
+      </p:grpSpPr>
+      <p:sp>
+        <p:nvSpPr>
+          <p:cNvPr id="2" name="Folienbildplatzhalter 1"/>
+          <p:cNvSpPr>
+            <a:spLocks noGrp="1" noRot="1" noChangeAspect="1"/>
+          </p:cNvSpPr>
+          <p:nvPr>
+            <p:ph type="sldImg"/>
+          </p:nvPr>
+        </p:nvSpPr>
+        <p:spPr/>
+      </p:sp>
+      <p:sp>
+        <p:nvSpPr>
+          <p:cNvPr id="3" name="Notizenplatzhalter 2"/>
+          <p:cNvSpPr>
+            <a:spLocks noGrp="1"/>
+          </p:cNvSpPr>
+          <p:nvPr>
+            <p:ph type="body" idx="1"/>
+          </p:nvPr>
+        </p:nvSpPr>
+        <p:spPr/>
+        <p:txBody>
+          <a:bodyPr/>
+          <a:lstStyle/>
+          <a:p>
+            <a:r>
+              <a:rPr lang="de-CH" dirty="0"/>
+              <a:t>Thank </a:t>
+            </a:r>
+            <a:r>
+              <a:rPr lang="de-CH" dirty="0" err="1"/>
+              <a:t>you</a:t>
+            </a:r>
+            <a:r>
+              <a:rPr lang="de-CH" dirty="0"/>
+              <a:t> </a:t>
+            </a:r>
+            <a:r>
+              <a:rPr lang="de-CH" dirty="0" err="1"/>
+              <a:t>for</a:t>
+            </a:r>
+            <a:r>
+              <a:rPr lang="de-CH" dirty="0"/>
+              <a:t> your </a:t>
+            </a:r>
+            <a:r>
+              <a:rPr lang="de-CH" dirty="0" err="1"/>
+              <a:t>patience</a:t>
+            </a:r>
+            <a:r>
+              <a:rPr lang="de-CH"/>
+              <a:t>.</a:t>
+            </a:r>
+          </a:p>
+        </p:txBody>
+      </p:sp>
+      <p:sp>
+        <p:nvSpPr>
+          <p:cNvPr id="4" name="Foliennummernplatzhalter 3"/>
+          <p:cNvSpPr>
+            <a:spLocks noGrp="1"/>
+          </p:cNvSpPr>
+          <p:nvPr>
+            <p:ph type="sldNum" sz="quarter" idx="5"/>
+          </p:nvPr>
+        </p:nvSpPr>
+        <p:spPr/>
+        <p:txBody>
+          <a:bodyPr/>
+          <a:lstStyle/>
+          <a:p>
+            <a:fld id="{F08A1825-D802-43E6-88CE-6E727D15DE22}" type="slidenum">
+              <a:rPr lang="de-CH" smtClean="0"/>
+              <a:t>7</a:t>
+            </a:fld>
+            <a:endParaRPr lang="de-CH"/>
+          </a:p>
+        </p:txBody>
+      </p:sp>
+    </p:spTree>
+    <p:extLst>
+      <p:ext uri="{BB962C8B-B14F-4D97-AF65-F5344CB8AC3E}">
+        <p14:creationId xmlns:p14="http://schemas.microsoft.com/office/powerpoint/2010/main" val="2542285985"/>
+      </p:ext>
+    </p:extLst>
+  </p:cSld>
+  <p:clrMapOvr>
+    <a:masterClrMapping/>
+  </p:clrMapOvr>
+</p:notes>
+</file>
+
 <file path=ppt/slideLayouts/slideLayout1.xml><?xml version="1.0" encoding="utf-8"?>
 <p:sldLayout xmlns:a="http://schemas.openxmlformats.org/drawingml/2006/main" xmlns:r="http://schemas.openxmlformats.org/officeDocument/2006/relationships" xmlns:p="http://schemas.openxmlformats.org/presentationml/2006/main" type="title" preserve="1">
   <p:cSld name="Titelfolie">
@@ -261,7 +3046,7 @@
           <a:p>
             <a:fld id="{D3EB3054-B75A-4BD7-8B3E-8DC0F614FAF3}" type="datetimeFigureOut">
               <a:rPr lang="de-DE" smtClean="0"/>
-              <a:t>10.12.2023</a:t>
+              <a:t>13.12.2023</a:t>
             </a:fld>
             <a:endParaRPr lang="de-DE"/>
           </a:p>
@@ -303,7 +3088,7 @@
           <a:p>
             <a:fld id="{802006FE-6571-4354-8775-F8708372C227}" type="slidenum">
               <a:rPr lang="de-DE" smtClean="0"/>
-              <a:t>‹#›</a:t>
+              <a:t>‹Nr.›</a:t>
             </a:fld>
             <a:endParaRPr lang="de-DE"/>
           </a:p>
@@ -429,7 +3214,7 @@
           <a:p>
             <a:fld id="{D3EB3054-B75A-4BD7-8B3E-8DC0F614FAF3}" type="datetimeFigureOut">
               <a:rPr lang="de-DE" smtClean="0"/>
-              <a:t>10.12.2023</a:t>
+              <a:t>13.12.2023</a:t>
             </a:fld>
             <a:endParaRPr lang="de-DE"/>
           </a:p>
@@ -471,7 +3256,7 @@
           <a:p>
             <a:fld id="{802006FE-6571-4354-8775-F8708372C227}" type="slidenum">
               <a:rPr lang="de-DE" smtClean="0"/>
-              <a:t>‹#›</a:t>
+              <a:t>‹Nr.›</a:t>
             </a:fld>
             <a:endParaRPr lang="de-DE"/>
           </a:p>
@@ -607,7 +3392,7 @@
           <a:p>
             <a:fld id="{D3EB3054-B75A-4BD7-8B3E-8DC0F614FAF3}" type="datetimeFigureOut">
               <a:rPr lang="de-DE" smtClean="0"/>
-              <a:t>10.12.2023</a:t>
+              <a:t>13.12.2023</a:t>
             </a:fld>
             <a:endParaRPr lang="de-DE"/>
           </a:p>
@@ -649,7 +3434,7 @@
           <a:p>
             <a:fld id="{802006FE-6571-4354-8775-F8708372C227}" type="slidenum">
               <a:rPr lang="de-DE" smtClean="0"/>
-              <a:t>‹#›</a:t>
+              <a:t>‹Nr.›</a:t>
             </a:fld>
             <a:endParaRPr lang="de-DE"/>
           </a:p>
@@ -775,7 +3560,7 @@
           <a:p>
             <a:fld id="{D3EB3054-B75A-4BD7-8B3E-8DC0F614FAF3}" type="datetimeFigureOut">
               <a:rPr lang="de-DE" smtClean="0"/>
-              <a:t>10.12.2023</a:t>
+              <a:t>13.12.2023</a:t>
             </a:fld>
             <a:endParaRPr lang="de-DE"/>
           </a:p>
@@ -817,7 +3602,7 @@
           <a:p>
             <a:fld id="{802006FE-6571-4354-8775-F8708372C227}" type="slidenum">
               <a:rPr lang="de-DE" smtClean="0"/>
-              <a:t>‹#›</a:t>
+              <a:t>‹Nr.›</a:t>
             </a:fld>
             <a:endParaRPr lang="de-DE"/>
           </a:p>
@@ -1020,7 +3805,7 @@
           <a:p>
             <a:fld id="{D3EB3054-B75A-4BD7-8B3E-8DC0F614FAF3}" type="datetimeFigureOut">
               <a:rPr lang="de-DE" smtClean="0"/>
-              <a:t>10.12.2023</a:t>
+              <a:t>13.12.2023</a:t>
             </a:fld>
             <a:endParaRPr lang="de-DE"/>
           </a:p>
@@ -1062,7 +3847,7 @@
           <a:p>
             <a:fld id="{802006FE-6571-4354-8775-F8708372C227}" type="slidenum">
               <a:rPr lang="de-DE" smtClean="0"/>
-              <a:t>‹#›</a:t>
+              <a:t>‹Nr.›</a:t>
             </a:fld>
             <a:endParaRPr lang="de-DE"/>
           </a:p>
@@ -1249,7 +4034,7 @@
           <a:p>
             <a:fld id="{D3EB3054-B75A-4BD7-8B3E-8DC0F614FAF3}" type="datetimeFigureOut">
               <a:rPr lang="de-DE" smtClean="0"/>
-              <a:t>10.12.2023</a:t>
+              <a:t>13.12.2023</a:t>
             </a:fld>
             <a:endParaRPr lang="de-DE"/>
           </a:p>
@@ -1291,7 +4076,7 @@
           <a:p>
             <a:fld id="{802006FE-6571-4354-8775-F8708372C227}" type="slidenum">
               <a:rPr lang="de-DE" smtClean="0"/>
-              <a:t>‹#›</a:t>
+              <a:t>‹Nr.›</a:t>
             </a:fld>
             <a:endParaRPr lang="de-DE"/>
           </a:p>
@@ -1613,7 +4398,7 @@
           <a:p>
             <a:fld id="{D3EB3054-B75A-4BD7-8B3E-8DC0F614FAF3}" type="datetimeFigureOut">
               <a:rPr lang="de-DE" smtClean="0"/>
-              <a:t>10.12.2023</a:t>
+              <a:t>13.12.2023</a:t>
             </a:fld>
             <a:endParaRPr lang="de-DE"/>
           </a:p>
@@ -1655,7 +4440,7 @@
           <a:p>
             <a:fld id="{802006FE-6571-4354-8775-F8708372C227}" type="slidenum">
               <a:rPr lang="de-DE" smtClean="0"/>
-              <a:t>‹#›</a:t>
+              <a:t>‹Nr.›</a:t>
             </a:fld>
             <a:endParaRPr lang="de-DE"/>
           </a:p>
@@ -1730,7 +4515,7 @@
           <a:p>
             <a:fld id="{D3EB3054-B75A-4BD7-8B3E-8DC0F614FAF3}" type="datetimeFigureOut">
               <a:rPr lang="de-DE" smtClean="0"/>
-              <a:t>10.12.2023</a:t>
+              <a:t>13.12.2023</a:t>
             </a:fld>
             <a:endParaRPr lang="de-DE"/>
           </a:p>
@@ -1772,7 +4557,7 @@
           <a:p>
             <a:fld id="{802006FE-6571-4354-8775-F8708372C227}" type="slidenum">
               <a:rPr lang="de-DE" smtClean="0"/>
-              <a:t>‹#›</a:t>
+              <a:t>‹Nr.›</a:t>
             </a:fld>
             <a:endParaRPr lang="de-DE"/>
           </a:p>
@@ -1825,7 +4610,7 @@
           <a:p>
             <a:fld id="{D3EB3054-B75A-4BD7-8B3E-8DC0F614FAF3}" type="datetimeFigureOut">
               <a:rPr lang="de-DE" smtClean="0"/>
-              <a:t>10.12.2023</a:t>
+              <a:t>13.12.2023</a:t>
             </a:fld>
             <a:endParaRPr lang="de-DE"/>
           </a:p>
@@ -1867,7 +4652,7 @@
           <a:p>
             <a:fld id="{802006FE-6571-4354-8775-F8708372C227}" type="slidenum">
               <a:rPr lang="de-DE" smtClean="0"/>
-              <a:t>‹#›</a:t>
+              <a:t>‹Nr.›</a:t>
             </a:fld>
             <a:endParaRPr lang="de-DE"/>
           </a:p>
@@ -2100,7 +4885,7 @@
           <a:p>
             <a:fld id="{D3EB3054-B75A-4BD7-8B3E-8DC0F614FAF3}" type="datetimeFigureOut">
               <a:rPr lang="de-DE" smtClean="0"/>
-              <a:t>10.12.2023</a:t>
+              <a:t>13.12.2023</a:t>
             </a:fld>
             <a:endParaRPr lang="de-DE"/>
           </a:p>
@@ -2142,7 +4927,7 @@
           <a:p>
             <a:fld id="{802006FE-6571-4354-8775-F8708372C227}" type="slidenum">
               <a:rPr lang="de-DE" smtClean="0"/>
-              <a:t>‹#›</a:t>
+              <a:t>‹Nr.›</a:t>
             </a:fld>
             <a:endParaRPr lang="de-DE"/>
           </a:p>
@@ -2352,7 +5137,7 @@
           <a:p>
             <a:fld id="{D3EB3054-B75A-4BD7-8B3E-8DC0F614FAF3}" type="datetimeFigureOut">
               <a:rPr lang="de-DE" smtClean="0"/>
-              <a:t>10.12.2023</a:t>
+              <a:t>13.12.2023</a:t>
             </a:fld>
             <a:endParaRPr lang="de-DE"/>
           </a:p>
@@ -2394,7 +5179,7 @@
           <a:p>
             <a:fld id="{802006FE-6571-4354-8775-F8708372C227}" type="slidenum">
               <a:rPr lang="de-DE" smtClean="0"/>
-              <a:t>‹#›</a:t>
+              <a:t>‹Nr.›</a:t>
             </a:fld>
             <a:endParaRPr lang="de-DE"/>
           </a:p>
@@ -2563,7 +5348,7 @@
           <a:p>
             <a:fld id="{D3EB3054-B75A-4BD7-8B3E-8DC0F614FAF3}" type="datetimeFigureOut">
               <a:rPr lang="de-DE" smtClean="0"/>
-              <a:t>10.12.2023</a:t>
+              <a:t>13.12.2023</a:t>
             </a:fld>
             <a:endParaRPr lang="de-DE"/>
           </a:p>
@@ -2641,7 +5426,7 @@
           <a:p>
             <a:fld id="{802006FE-6571-4354-8775-F8708372C227}" type="slidenum">
               <a:rPr lang="de-DE" smtClean="0"/>
-              <a:t>‹#›</a:t>
+              <a:t>‹Nr.›</a:t>
             </a:fld>
             <a:endParaRPr lang="de-DE"/>
           </a:p>
@@ -3346,7 +6131,7 @@
           <p:nvPr/>
         </p:nvPicPr>
         <p:blipFill rotWithShape="1">
-          <a:blip r:embed="rId2"/>
+          <a:blip r:embed="rId3"/>
           <a:srcRect r="47658" b="-3"/>
           <a:stretch/>
         </p:blipFill>
@@ -3470,10 +6255,10 @@
           <p:nvPr/>
         </p:nvPicPr>
         <p:blipFill>
-          <a:blip r:embed="rId2">
+          <a:blip r:embed="rId3">
             <a:extLst>
               <a:ext uri="{96DAC541-7B7A-43D3-8B79-37D633B846F1}">
-                <asvg:svgBlip xmlns:asvg="http://schemas.microsoft.com/office/drawing/2016/SVG/main" r:embed="rId3"/>
+                <asvg:svgBlip xmlns:asvg="http://schemas.microsoft.com/office/drawing/2016/SVG/main" r:embed="rId4"/>
               </a:ext>
             </a:extLst>
           </a:blip>
@@ -3506,7 +6291,7 @@
           <p:nvPr/>
         </p:nvPicPr>
         <p:blipFill rotWithShape="1">
-          <a:blip r:embed="rId4"/>
+          <a:blip r:embed="rId5"/>
           <a:srcRect l="15217" t="18546" r="11635" b="18478"/>
           <a:stretch/>
         </p:blipFill>
@@ -3526,180 +6311,6 @@
             <a:extLst>
               <a:ext uri="{FF2B5EF4-FFF2-40B4-BE49-F238E27FC236}">
                 <a16:creationId xmlns:a16="http://schemas.microsoft.com/office/drawing/2014/main" id="{8D3E5306-3BBD-E2B3-5063-4CDD864FBFE5}"/>
-              </a:ext>
-            </a:extLst>
-          </p:cNvPr>
-          <p:cNvPicPr>
-            <a:picLocks noChangeAspect="1"/>
-          </p:cNvPicPr>
-          <p:nvPr/>
-        </p:nvPicPr>
-        <p:blipFill>
-          <a:blip r:embed="rId5"/>
-          <a:stretch>
-            <a:fillRect/>
-          </a:stretch>
-        </p:blipFill>
-        <p:spPr>
-          <a:xfrm>
-            <a:off x="800310" y="2764668"/>
-            <a:ext cx="1751015" cy="691049"/>
-          </a:xfrm>
-          <a:prstGeom prst="rect">
-            <a:avLst/>
-          </a:prstGeom>
-        </p:spPr>
-      </p:pic>
-      <p:pic>
-        <p:nvPicPr>
-          <p:cNvPr id="35" name="Graphic 34" descr="Pfeil nach rechts mit einfarbiger Füllung">
-            <a:extLst>
-              <a:ext uri="{FF2B5EF4-FFF2-40B4-BE49-F238E27FC236}">
-                <a16:creationId xmlns:a16="http://schemas.microsoft.com/office/drawing/2014/main" id="{D21665A2-A23D-78AB-C96D-BD20854F545F}"/>
-              </a:ext>
-            </a:extLst>
-          </p:cNvPr>
-          <p:cNvPicPr>
-            <a:picLocks noChangeAspect="1"/>
-          </p:cNvPicPr>
-          <p:nvPr/>
-        </p:nvPicPr>
-        <p:blipFill>
-          <a:blip r:embed="rId2">
-            <a:extLst>
-              <a:ext uri="{96DAC541-7B7A-43D3-8B79-37D633B846F1}">
-                <asvg:svgBlip xmlns:asvg="http://schemas.microsoft.com/office/drawing/2016/SVG/main" r:embed="rId3"/>
-              </a:ext>
-            </a:extLst>
-          </a:blip>
-          <a:stretch>
-            <a:fillRect/>
-          </a:stretch>
-        </p:blipFill>
-        <p:spPr>
-          <a:xfrm rot="2280000">
-            <a:off x="2264720" y="3197776"/>
-            <a:ext cx="1185050" cy="810891"/>
-          </a:xfrm>
-          <a:prstGeom prst="rect">
-            <a:avLst/>
-          </a:prstGeom>
-        </p:spPr>
-      </p:pic>
-      <p:pic>
-        <p:nvPicPr>
-          <p:cNvPr id="40" name="Graphic 39" descr="Pfeil nach rechts mit einfarbiger Füllung">
-            <a:extLst>
-              <a:ext uri="{FF2B5EF4-FFF2-40B4-BE49-F238E27FC236}">
-                <a16:creationId xmlns:a16="http://schemas.microsoft.com/office/drawing/2014/main" id="{EBAAC21F-8AA9-150E-CDE8-7D61A24D9C25}"/>
-              </a:ext>
-            </a:extLst>
-          </p:cNvPr>
-          <p:cNvPicPr>
-            <a:picLocks noChangeAspect="1"/>
-          </p:cNvPicPr>
-          <p:nvPr/>
-        </p:nvPicPr>
-        <p:blipFill>
-          <a:blip r:embed="rId2">
-            <a:extLst>
-              <a:ext uri="{96DAC541-7B7A-43D3-8B79-37D633B846F1}">
-                <asvg:svgBlip xmlns:asvg="http://schemas.microsoft.com/office/drawing/2016/SVG/main" r:embed="rId3"/>
-              </a:ext>
-            </a:extLst>
-          </a:blip>
-          <a:stretch>
-            <a:fillRect/>
-          </a:stretch>
-        </p:blipFill>
-        <p:spPr>
-          <a:xfrm rot="-3000000">
-            <a:off x="5159694" y="4997603"/>
-            <a:ext cx="894287" cy="810891"/>
-          </a:xfrm>
-          <a:prstGeom prst="rect">
-            <a:avLst/>
-          </a:prstGeom>
-        </p:spPr>
-      </p:pic>
-      <p:pic>
-        <p:nvPicPr>
-          <p:cNvPr id="41" name="Graphic 40" descr="Pfeil nach rechts mit einfarbiger Füllung">
-            <a:extLst>
-              <a:ext uri="{FF2B5EF4-FFF2-40B4-BE49-F238E27FC236}">
-                <a16:creationId xmlns:a16="http://schemas.microsoft.com/office/drawing/2014/main" id="{A2699795-B7D1-D269-8C33-55FCE30EE672}"/>
-              </a:ext>
-            </a:extLst>
-          </p:cNvPr>
-          <p:cNvPicPr>
-            <a:picLocks noChangeAspect="1"/>
-          </p:cNvPicPr>
-          <p:nvPr/>
-        </p:nvPicPr>
-        <p:blipFill>
-          <a:blip r:embed="rId2">
-            <a:extLst>
-              <a:ext uri="{96DAC541-7B7A-43D3-8B79-37D633B846F1}">
-                <asvg:svgBlip xmlns:asvg="http://schemas.microsoft.com/office/drawing/2016/SVG/main" r:embed="rId3"/>
-              </a:ext>
-            </a:extLst>
-          </a:blip>
-          <a:stretch>
-            <a:fillRect/>
-          </a:stretch>
-        </p:blipFill>
-        <p:spPr>
-          <a:xfrm rot="10800000">
-            <a:off x="8044063" y="3155697"/>
-            <a:ext cx="1215129" cy="1101654"/>
-          </a:xfrm>
-          <a:prstGeom prst="rect">
-            <a:avLst/>
-          </a:prstGeom>
-        </p:spPr>
-      </p:pic>
-      <p:pic>
-        <p:nvPicPr>
-          <p:cNvPr id="43" name="Graphic 42" descr="Pfeil nach rechts mit einfarbiger Füllung">
-            <a:extLst>
-              <a:ext uri="{FF2B5EF4-FFF2-40B4-BE49-F238E27FC236}">
-                <a16:creationId xmlns:a16="http://schemas.microsoft.com/office/drawing/2014/main" id="{A0F21ACB-8AF0-5A41-DF9B-C18E451A13F9}"/>
-              </a:ext>
-            </a:extLst>
-          </p:cNvPr>
-          <p:cNvPicPr>
-            <a:picLocks noChangeAspect="1"/>
-          </p:cNvPicPr>
-          <p:nvPr/>
-        </p:nvPicPr>
-        <p:blipFill>
-          <a:blip r:embed="rId2">
-            <a:extLst>
-              <a:ext uri="{96DAC541-7B7A-43D3-8B79-37D633B846F1}">
-                <asvg:svgBlip xmlns:asvg="http://schemas.microsoft.com/office/drawing/2016/SVG/main" r:embed="rId3"/>
-              </a:ext>
-            </a:extLst>
-          </a:blip>
-          <a:stretch>
-            <a:fillRect/>
-          </a:stretch>
-        </p:blipFill>
-        <p:spPr>
-          <a:xfrm rot="13500000">
-            <a:off x="7982391" y="4737249"/>
-            <a:ext cx="894287" cy="810891"/>
-          </a:xfrm>
-          <a:prstGeom prst="rect">
-            <a:avLst/>
-          </a:prstGeom>
-        </p:spPr>
-      </p:pic>
-      <p:pic>
-        <p:nvPicPr>
-          <p:cNvPr id="47" name="Picture 46">
-            <a:extLst>
-              <a:ext uri="{FF2B5EF4-FFF2-40B4-BE49-F238E27FC236}">
-                <a16:creationId xmlns:a16="http://schemas.microsoft.com/office/drawing/2014/main" id="{DD47A6C4-31DB-0EB2-3F17-10C74F722054}"/>
               </a:ext>
             </a:extLst>
           </p:cNvPr>
@@ -3716,8 +6327,8 @@
         </p:blipFill>
         <p:spPr>
           <a:xfrm>
-            <a:off x="3516802" y="5749087"/>
-            <a:ext cx="2125007" cy="832474"/>
+            <a:off x="800310" y="2764668"/>
+            <a:ext cx="1751015" cy="691049"/>
           </a:xfrm>
           <a:prstGeom prst="rect">
             <a:avLst/>
@@ -3726,10 +6337,154 @@
       </p:pic>
       <p:pic>
         <p:nvPicPr>
-          <p:cNvPr id="48" name="Picture 47">
-            <a:extLst>
-              <a:ext uri="{FF2B5EF4-FFF2-40B4-BE49-F238E27FC236}">
-                <a16:creationId xmlns:a16="http://schemas.microsoft.com/office/drawing/2014/main" id="{86BE2670-7673-8F37-B319-080659B8B6A0}"/>
+          <p:cNvPr id="35" name="Graphic 34" descr="Pfeil nach rechts mit einfarbiger Füllung">
+            <a:extLst>
+              <a:ext uri="{FF2B5EF4-FFF2-40B4-BE49-F238E27FC236}">
+                <a16:creationId xmlns:a16="http://schemas.microsoft.com/office/drawing/2014/main" id="{D21665A2-A23D-78AB-C96D-BD20854F545F}"/>
+              </a:ext>
+            </a:extLst>
+          </p:cNvPr>
+          <p:cNvPicPr>
+            <a:picLocks noChangeAspect="1"/>
+          </p:cNvPicPr>
+          <p:nvPr/>
+        </p:nvPicPr>
+        <p:blipFill>
+          <a:blip r:embed="rId3">
+            <a:extLst>
+              <a:ext uri="{96DAC541-7B7A-43D3-8B79-37D633B846F1}">
+                <asvg:svgBlip xmlns:asvg="http://schemas.microsoft.com/office/drawing/2016/SVG/main" r:embed="rId4"/>
+              </a:ext>
+            </a:extLst>
+          </a:blip>
+          <a:stretch>
+            <a:fillRect/>
+          </a:stretch>
+        </p:blipFill>
+        <p:spPr>
+          <a:xfrm rot="2280000">
+            <a:off x="2264720" y="3197776"/>
+            <a:ext cx="1185050" cy="810891"/>
+          </a:xfrm>
+          <a:prstGeom prst="rect">
+            <a:avLst/>
+          </a:prstGeom>
+        </p:spPr>
+      </p:pic>
+      <p:pic>
+        <p:nvPicPr>
+          <p:cNvPr id="40" name="Graphic 39" descr="Pfeil nach rechts mit einfarbiger Füllung">
+            <a:extLst>
+              <a:ext uri="{FF2B5EF4-FFF2-40B4-BE49-F238E27FC236}">
+                <a16:creationId xmlns:a16="http://schemas.microsoft.com/office/drawing/2014/main" id="{EBAAC21F-8AA9-150E-CDE8-7D61A24D9C25}"/>
+              </a:ext>
+            </a:extLst>
+          </p:cNvPr>
+          <p:cNvPicPr>
+            <a:picLocks noChangeAspect="1"/>
+          </p:cNvPicPr>
+          <p:nvPr/>
+        </p:nvPicPr>
+        <p:blipFill>
+          <a:blip r:embed="rId3">
+            <a:extLst>
+              <a:ext uri="{96DAC541-7B7A-43D3-8B79-37D633B846F1}">
+                <asvg:svgBlip xmlns:asvg="http://schemas.microsoft.com/office/drawing/2016/SVG/main" r:embed="rId4"/>
+              </a:ext>
+            </a:extLst>
+          </a:blip>
+          <a:stretch>
+            <a:fillRect/>
+          </a:stretch>
+        </p:blipFill>
+        <p:spPr>
+          <a:xfrm rot="-3000000">
+            <a:off x="5159694" y="4997603"/>
+            <a:ext cx="894287" cy="810891"/>
+          </a:xfrm>
+          <a:prstGeom prst="rect">
+            <a:avLst/>
+          </a:prstGeom>
+        </p:spPr>
+      </p:pic>
+      <p:pic>
+        <p:nvPicPr>
+          <p:cNvPr id="41" name="Graphic 40" descr="Pfeil nach rechts mit einfarbiger Füllung">
+            <a:extLst>
+              <a:ext uri="{FF2B5EF4-FFF2-40B4-BE49-F238E27FC236}">
+                <a16:creationId xmlns:a16="http://schemas.microsoft.com/office/drawing/2014/main" id="{A2699795-B7D1-D269-8C33-55FCE30EE672}"/>
+              </a:ext>
+            </a:extLst>
+          </p:cNvPr>
+          <p:cNvPicPr>
+            <a:picLocks noChangeAspect="1"/>
+          </p:cNvPicPr>
+          <p:nvPr/>
+        </p:nvPicPr>
+        <p:blipFill>
+          <a:blip r:embed="rId3">
+            <a:extLst>
+              <a:ext uri="{96DAC541-7B7A-43D3-8B79-37D633B846F1}">
+                <asvg:svgBlip xmlns:asvg="http://schemas.microsoft.com/office/drawing/2016/SVG/main" r:embed="rId4"/>
+              </a:ext>
+            </a:extLst>
+          </a:blip>
+          <a:stretch>
+            <a:fillRect/>
+          </a:stretch>
+        </p:blipFill>
+        <p:spPr>
+          <a:xfrm rot="10800000">
+            <a:off x="8044063" y="3155697"/>
+            <a:ext cx="1215129" cy="1101654"/>
+          </a:xfrm>
+          <a:prstGeom prst="rect">
+            <a:avLst/>
+          </a:prstGeom>
+        </p:spPr>
+      </p:pic>
+      <p:pic>
+        <p:nvPicPr>
+          <p:cNvPr id="43" name="Graphic 42" descr="Pfeil nach rechts mit einfarbiger Füllung">
+            <a:extLst>
+              <a:ext uri="{FF2B5EF4-FFF2-40B4-BE49-F238E27FC236}">
+                <a16:creationId xmlns:a16="http://schemas.microsoft.com/office/drawing/2014/main" id="{A0F21ACB-8AF0-5A41-DF9B-C18E451A13F9}"/>
+              </a:ext>
+            </a:extLst>
+          </p:cNvPr>
+          <p:cNvPicPr>
+            <a:picLocks noChangeAspect="1"/>
+          </p:cNvPicPr>
+          <p:nvPr/>
+        </p:nvPicPr>
+        <p:blipFill>
+          <a:blip r:embed="rId3">
+            <a:extLst>
+              <a:ext uri="{96DAC541-7B7A-43D3-8B79-37D633B846F1}">
+                <asvg:svgBlip xmlns:asvg="http://schemas.microsoft.com/office/drawing/2016/SVG/main" r:embed="rId4"/>
+              </a:ext>
+            </a:extLst>
+          </a:blip>
+          <a:stretch>
+            <a:fillRect/>
+          </a:stretch>
+        </p:blipFill>
+        <p:spPr>
+          <a:xfrm rot="13500000">
+            <a:off x="7982391" y="4737249"/>
+            <a:ext cx="894287" cy="810891"/>
+          </a:xfrm>
+          <a:prstGeom prst="rect">
+            <a:avLst/>
+          </a:prstGeom>
+        </p:spPr>
+      </p:pic>
+      <p:pic>
+        <p:nvPicPr>
+          <p:cNvPr id="47" name="Picture 46">
+            <a:extLst>
+              <a:ext uri="{FF2B5EF4-FFF2-40B4-BE49-F238E27FC236}">
+                <a16:creationId xmlns:a16="http://schemas.microsoft.com/office/drawing/2014/main" id="{DD47A6C4-31DB-0EB2-3F17-10C74F722054}"/>
               </a:ext>
             </a:extLst>
           </p:cNvPr>
@@ -3746,8 +6501,8 @@
         </p:blipFill>
         <p:spPr>
           <a:xfrm>
-            <a:off x="8731775" y="5407698"/>
-            <a:ext cx="1935652" cy="968385"/>
+            <a:off x="3516802" y="5749087"/>
+            <a:ext cx="2125007" cy="832474"/>
           </a:xfrm>
           <a:prstGeom prst="rect">
             <a:avLst/>
@@ -3756,10 +6511,10 @@
       </p:pic>
       <p:pic>
         <p:nvPicPr>
-          <p:cNvPr id="49" name="Picture 48">
-            <a:extLst>
-              <a:ext uri="{FF2B5EF4-FFF2-40B4-BE49-F238E27FC236}">
-                <a16:creationId xmlns:a16="http://schemas.microsoft.com/office/drawing/2014/main" id="{D9B26CEF-A404-84AC-5A29-0753594F9D1A}"/>
+          <p:cNvPr id="48" name="Picture 47">
+            <a:extLst>
+              <a:ext uri="{FF2B5EF4-FFF2-40B4-BE49-F238E27FC236}">
+                <a16:creationId xmlns:a16="http://schemas.microsoft.com/office/drawing/2014/main" id="{86BE2670-7673-8F37-B319-080659B8B6A0}"/>
               </a:ext>
             </a:extLst>
           </p:cNvPr>
@@ -3770,6 +6525,36 @@
         </p:nvPicPr>
         <p:blipFill>
           <a:blip r:embed="rId8"/>
+          <a:stretch>
+            <a:fillRect/>
+          </a:stretch>
+        </p:blipFill>
+        <p:spPr>
+          <a:xfrm>
+            <a:off x="8731775" y="5407698"/>
+            <a:ext cx="1935652" cy="968385"/>
+          </a:xfrm>
+          <a:prstGeom prst="rect">
+            <a:avLst/>
+          </a:prstGeom>
+        </p:spPr>
+      </p:pic>
+      <p:pic>
+        <p:nvPicPr>
+          <p:cNvPr id="49" name="Picture 48">
+            <a:extLst>
+              <a:ext uri="{FF2B5EF4-FFF2-40B4-BE49-F238E27FC236}">
+                <a16:creationId xmlns:a16="http://schemas.microsoft.com/office/drawing/2014/main" id="{D9B26CEF-A404-84AC-5A29-0753594F9D1A}"/>
+              </a:ext>
+            </a:extLst>
+          </p:cNvPr>
+          <p:cNvPicPr>
+            <a:picLocks noChangeAspect="1"/>
+          </p:cNvPicPr>
+          <p:nvPr/>
+        </p:nvPicPr>
+        <p:blipFill>
+          <a:blip r:embed="rId9"/>
           <a:stretch>
             <a:fillRect/>
           </a:stretch>
@@ -4089,7 +6874,7 @@
           <p:nvPr/>
         </p:nvPicPr>
         <p:blipFill>
-          <a:blip r:embed="rId2"/>
+          <a:blip r:embed="rId3"/>
           <a:stretch>
             <a:fillRect/>
           </a:stretch>
@@ -4130,13 +6915,13 @@
           <a:bodyPr/>
           <a:lstStyle/>
           <a:p>
-            <a:endParaRPr lang="en-US" sz="3200">
+            <a:endParaRPr lang="en-US" sz="3200" dirty="0">
               <a:ea typeface="Calibri Light"/>
               <a:cs typeface="Calibri Light"/>
             </a:endParaRPr>
           </a:p>
           <a:p>
-            <a:endParaRPr lang="en-US">
+            <a:endParaRPr lang="en-US" dirty="0">
               <a:ea typeface="Calibri Light"/>
               <a:cs typeface="Calibri Light"/>
             </a:endParaRPr>
@@ -4158,10 +6943,10 @@
           <p:nvPr/>
         </p:nvPicPr>
         <p:blipFill>
-          <a:blip r:embed="rId3">
+          <a:blip r:embed="rId4">
             <a:extLst>
               <a:ext uri="{96DAC541-7B7A-43D3-8B79-37D633B846F1}">
-                <asvg:svgBlip xmlns:asvg="http://schemas.microsoft.com/office/drawing/2016/SVG/main" r:embed="rId4"/>
+                <asvg:svgBlip xmlns:asvg="http://schemas.microsoft.com/office/drawing/2016/SVG/main" r:embed="rId5"/>
               </a:ext>
             </a:extLst>
           </a:blip>
@@ -4194,10 +6979,10 @@
           <p:nvPr/>
         </p:nvPicPr>
         <p:blipFill>
-          <a:blip r:embed="rId5">
+          <a:blip r:embed="rId6">
             <a:extLst>
               <a:ext uri="{96DAC541-7B7A-43D3-8B79-37D633B846F1}">
-                <asvg:svgBlip xmlns:asvg="http://schemas.microsoft.com/office/drawing/2016/SVG/main" r:embed="rId6"/>
+                <asvg:svgBlip xmlns:asvg="http://schemas.microsoft.com/office/drawing/2016/SVG/main" r:embed="rId7"/>
               </a:ext>
             </a:extLst>
           </a:blip>
@@ -4230,10 +7015,10 @@
           <p:nvPr/>
         </p:nvPicPr>
         <p:blipFill>
-          <a:blip r:embed="rId7">
+          <a:blip r:embed="rId8">
             <a:extLst>
               <a:ext uri="{96DAC541-7B7A-43D3-8B79-37D633B846F1}">
-                <asvg:svgBlip xmlns:asvg="http://schemas.microsoft.com/office/drawing/2016/SVG/main" r:embed="rId8"/>
+                <asvg:svgBlip xmlns:asvg="http://schemas.microsoft.com/office/drawing/2016/SVG/main" r:embed="rId9"/>
               </a:ext>
             </a:extLst>
           </a:blip>
@@ -4266,10 +7051,10 @@
           <p:nvPr/>
         </p:nvPicPr>
         <p:blipFill>
-          <a:blip r:embed="rId9">
+          <a:blip r:embed="rId10">
             <a:extLst>
               <a:ext uri="{96DAC541-7B7A-43D3-8B79-37D633B846F1}">
-                <asvg:svgBlip xmlns:asvg="http://schemas.microsoft.com/office/drawing/2016/SVG/main" r:embed="rId10"/>
+                <asvg:svgBlip xmlns:asvg="http://schemas.microsoft.com/office/drawing/2016/SVG/main" r:embed="rId11"/>
               </a:ext>
             </a:extLst>
           </a:blip>
@@ -4302,10 +7087,10 @@
           <p:nvPr/>
         </p:nvPicPr>
         <p:blipFill>
-          <a:blip r:embed="rId11">
+          <a:blip r:embed="rId12">
             <a:extLst>
               <a:ext uri="{96DAC541-7B7A-43D3-8B79-37D633B846F1}">
-                <asvg:svgBlip xmlns:asvg="http://schemas.microsoft.com/office/drawing/2016/SVG/main" r:embed="rId12"/>
+                <asvg:svgBlip xmlns:asvg="http://schemas.microsoft.com/office/drawing/2016/SVG/main" r:embed="rId13"/>
               </a:ext>
             </a:extLst>
           </a:blip>
@@ -4338,10 +7123,10 @@
           <p:nvPr/>
         </p:nvPicPr>
         <p:blipFill>
-          <a:blip r:embed="rId13">
+          <a:blip r:embed="rId14">
             <a:extLst>
               <a:ext uri="{96DAC541-7B7A-43D3-8B79-37D633B846F1}">
-                <asvg:svgBlip xmlns:asvg="http://schemas.microsoft.com/office/drawing/2016/SVG/main" r:embed="rId14"/>
+                <asvg:svgBlip xmlns:asvg="http://schemas.microsoft.com/office/drawing/2016/SVG/main" r:embed="rId15"/>
               </a:ext>
             </a:extLst>
           </a:blip>
@@ -4374,10 +7159,10 @@
           <p:nvPr/>
         </p:nvPicPr>
         <p:blipFill>
-          <a:blip r:embed="rId13">
+          <a:blip r:embed="rId14">
             <a:extLst>
               <a:ext uri="{96DAC541-7B7A-43D3-8B79-37D633B846F1}">
-                <asvg:svgBlip xmlns:asvg="http://schemas.microsoft.com/office/drawing/2016/SVG/main" r:embed="rId14"/>
+                <asvg:svgBlip xmlns:asvg="http://schemas.microsoft.com/office/drawing/2016/SVG/main" r:embed="rId15"/>
               </a:ext>
             </a:extLst>
           </a:blip>
@@ -4410,10 +7195,10 @@
           <p:nvPr/>
         </p:nvPicPr>
         <p:blipFill>
-          <a:blip r:embed="rId13">
+          <a:blip r:embed="rId14">
             <a:extLst>
               <a:ext uri="{96DAC541-7B7A-43D3-8B79-37D633B846F1}">
-                <asvg:svgBlip xmlns:asvg="http://schemas.microsoft.com/office/drawing/2016/SVG/main" r:embed="rId14"/>
+                <asvg:svgBlip xmlns:asvg="http://schemas.microsoft.com/office/drawing/2016/SVG/main" r:embed="rId15"/>
               </a:ext>
             </a:extLst>
           </a:blip>
@@ -4446,10 +7231,10 @@
           <p:nvPr/>
         </p:nvPicPr>
         <p:blipFill>
-          <a:blip r:embed="rId13">
+          <a:blip r:embed="rId14">
             <a:extLst>
               <a:ext uri="{96DAC541-7B7A-43D3-8B79-37D633B846F1}">
-                <asvg:svgBlip xmlns:asvg="http://schemas.microsoft.com/office/drawing/2016/SVG/main" r:embed="rId14"/>
+                <asvg:svgBlip xmlns:asvg="http://schemas.microsoft.com/office/drawing/2016/SVG/main" r:embed="rId15"/>
               </a:ext>
             </a:extLst>
           </a:blip>
@@ -4482,10 +7267,10 @@
           <p:nvPr/>
         </p:nvPicPr>
         <p:blipFill>
-          <a:blip r:embed="rId15">
+          <a:blip r:embed="rId16">
             <a:extLst>
               <a:ext uri="{96DAC541-7B7A-43D3-8B79-37D633B846F1}">
-                <asvg:svgBlip xmlns:asvg="http://schemas.microsoft.com/office/drawing/2016/SVG/main" r:embed="rId16"/>
+                <asvg:svgBlip xmlns:asvg="http://schemas.microsoft.com/office/drawing/2016/SVG/main" r:embed="rId17"/>
               </a:ext>
             </a:extLst>
           </a:blip>
@@ -4518,10 +7303,10 @@
           <p:nvPr/>
         </p:nvPicPr>
         <p:blipFill>
-          <a:blip r:embed="rId17">
+          <a:blip r:embed="rId18">
             <a:extLst>
               <a:ext uri="{96DAC541-7B7A-43D3-8B79-37D633B846F1}">
-                <asvg:svgBlip xmlns:asvg="http://schemas.microsoft.com/office/drawing/2016/SVG/main" r:embed="rId18"/>
+                <asvg:svgBlip xmlns:asvg="http://schemas.microsoft.com/office/drawing/2016/SVG/main" r:embed="rId19"/>
               </a:ext>
             </a:extLst>
           </a:blip>
@@ -4554,10 +7339,10 @@
           <p:nvPr/>
         </p:nvPicPr>
         <p:blipFill>
-          <a:blip r:embed="rId19">
+          <a:blip r:embed="rId20">
             <a:extLst>
               <a:ext uri="{96DAC541-7B7A-43D3-8B79-37D633B846F1}">
-                <asvg:svgBlip xmlns:asvg="http://schemas.microsoft.com/office/drawing/2016/SVG/main" r:embed="rId20"/>
+                <asvg:svgBlip xmlns:asvg="http://schemas.microsoft.com/office/drawing/2016/SVG/main" r:embed="rId21"/>
               </a:ext>
             </a:extLst>
           </a:blip>
@@ -4590,10 +7375,10 @@
           <p:nvPr/>
         </p:nvPicPr>
         <p:blipFill>
-          <a:blip r:embed="rId21">
+          <a:blip r:embed="rId22">
             <a:extLst>
               <a:ext uri="{96DAC541-7B7A-43D3-8B79-37D633B846F1}">
-                <asvg:svgBlip xmlns:asvg="http://schemas.microsoft.com/office/drawing/2016/SVG/main" r:embed="rId22"/>
+                <asvg:svgBlip xmlns:asvg="http://schemas.microsoft.com/office/drawing/2016/SVG/main" r:embed="rId23"/>
               </a:ext>
             </a:extLst>
           </a:blip>
@@ -4626,10 +7411,10 @@
           <p:nvPr/>
         </p:nvPicPr>
         <p:blipFill>
-          <a:blip r:embed="rId23">
+          <a:blip r:embed="rId24">
             <a:extLst>
               <a:ext uri="{96DAC541-7B7A-43D3-8B79-37D633B846F1}">
-                <asvg:svgBlip xmlns:asvg="http://schemas.microsoft.com/office/drawing/2016/SVG/main" r:embed="rId24"/>
+                <asvg:svgBlip xmlns:asvg="http://schemas.microsoft.com/office/drawing/2016/SVG/main" r:embed="rId25"/>
               </a:ext>
             </a:extLst>
           </a:blip>
@@ -4662,10 +7447,10 @@
           <p:nvPr/>
         </p:nvPicPr>
         <p:blipFill>
-          <a:blip r:embed="rId25">
+          <a:blip r:embed="rId26">
             <a:extLst>
               <a:ext uri="{96DAC541-7B7A-43D3-8B79-37D633B846F1}">
-                <asvg:svgBlip xmlns:asvg="http://schemas.microsoft.com/office/drawing/2016/SVG/main" r:embed="rId26"/>
+                <asvg:svgBlip xmlns:asvg="http://schemas.microsoft.com/office/drawing/2016/SVG/main" r:embed="rId27"/>
               </a:ext>
             </a:extLst>
           </a:blip>
@@ -4876,10 +7661,10 @@
           <p:nvPr/>
         </p:nvPicPr>
         <p:blipFill>
-          <a:blip r:embed="rId15">
+          <a:blip r:embed="rId16">
             <a:extLst>
               <a:ext uri="{96DAC541-7B7A-43D3-8B79-37D633B846F1}">
-                <asvg:svgBlip xmlns:asvg="http://schemas.microsoft.com/office/drawing/2016/SVG/main" r:embed="rId16"/>
+                <asvg:svgBlip xmlns:asvg="http://schemas.microsoft.com/office/drawing/2016/SVG/main" r:embed="rId17"/>
               </a:ext>
             </a:extLst>
           </a:blip>
@@ -4912,10 +7697,10 @@
           <p:nvPr/>
         </p:nvPicPr>
         <p:blipFill>
-          <a:blip r:embed="rId27">
+          <a:blip r:embed="rId28">
             <a:extLst>
               <a:ext uri="{96DAC541-7B7A-43D3-8B79-37D633B846F1}">
-                <asvg:svgBlip xmlns:asvg="http://schemas.microsoft.com/office/drawing/2016/SVG/main" r:embed="rId28"/>
+                <asvg:svgBlip xmlns:asvg="http://schemas.microsoft.com/office/drawing/2016/SVG/main" r:embed="rId29"/>
               </a:ext>
             </a:extLst>
           </a:blip>
@@ -5043,13 +7828,13 @@
           <a:lstStyle/>
           <a:p>
             <a:r>
-              <a:rPr lang="en-US" sz="1000">
+              <a:rPr lang="en-US" sz="1000" dirty="0">
                 <a:ea typeface="+mn-lt"/>
                 <a:cs typeface="+mn-lt"/>
               </a:rPr>
               <a:t>[…, 0.161, 0.164, 0.159, 0.155, 0.148, 0.147, 0.141, 0.137, 0.136, 0.134, 0.135, 0.132, 0.126, 0.122, 0.118, 0.116, 0.116, 0.112, 0.112, 0.12, 0.121, 0.124, 0.126, 0.129, 0.136, 0.135, 0.141, 0.146, 0.15, 0.157, 0.161, 0.165, 0.17, 0.17, 0.175, 0.185, 0.183, 0.181, 0.183, 0.182, 0.195, 0.209, 0.193, 0.18, 0.189, 0.193, 0.186, 0.181, 0.185, 0.185, … ]</a:t>
             </a:r>
-            <a:endParaRPr lang="en-US">
+            <a:endParaRPr lang="en-US" dirty="0">
               <a:ea typeface="+mn-lt"/>
               <a:cs typeface="+mn-lt"/>
             </a:endParaRPr>
@@ -5071,10 +7856,10 @@
           <p:nvPr/>
         </p:nvPicPr>
         <p:blipFill>
-          <a:blip r:embed="rId29">
+          <a:blip r:embed="rId30">
             <a:extLst>
               <a:ext uri="{96DAC541-7B7A-43D3-8B79-37D633B846F1}">
-                <asvg:svgBlip xmlns:asvg="http://schemas.microsoft.com/office/drawing/2016/SVG/main" r:embed="rId30"/>
+                <asvg:svgBlip xmlns:asvg="http://schemas.microsoft.com/office/drawing/2016/SVG/main" r:embed="rId31"/>
               </a:ext>
             </a:extLst>
           </a:blip>
@@ -5203,16 +7988,16 @@
               </a:lnSpc>
             </a:pPr>
             <a:r>
-              <a:rPr lang="en-US" b="1">
+              <a:rPr lang="en-US" b="1" dirty="0">
                 <a:solidFill>
                   <a:srgbClr val="000000"/>
                 </a:solidFill>
                 <a:ea typeface="Calibri"/>
                 <a:cs typeface="Calibri"/>
               </a:rPr>
-              <a:t>Information</a:t>
-            </a:r>
-            <a:endParaRPr lang="en-US">
+              <a:t>Information Flow</a:t>
+            </a:r>
+            <a:endParaRPr lang="en-US" dirty="0">
               <a:solidFill>
                 <a:srgbClr val="000000"/>
               </a:solidFill>
@@ -5267,16 +8052,16 @@
               </a:lnSpc>
             </a:pPr>
             <a:r>
-              <a:rPr lang="en-US" b="1">
+              <a:rPr lang="en-US" b="1" dirty="0">
                 <a:solidFill>
                   <a:srgbClr val="000000"/>
                 </a:solidFill>
                 <a:ea typeface="Calibri"/>
                 <a:cs typeface="Calibri"/>
               </a:rPr>
-              <a:t>Receptors</a:t>
-            </a:r>
-            <a:endParaRPr lang="en-US">
+              <a:t>Stimuli</a:t>
+            </a:r>
+            <a:endParaRPr lang="en-US" dirty="0">
               <a:solidFill>
                 <a:srgbClr val="000000"/>
               </a:solidFill>
@@ -5363,10 +8148,10 @@
           <p:nvPr/>
         </p:nvPicPr>
         <p:blipFill>
-          <a:blip r:embed="rId15">
+          <a:blip r:embed="rId16">
             <a:extLst>
               <a:ext uri="{96DAC541-7B7A-43D3-8B79-37D633B846F1}">
-                <asvg:svgBlip xmlns:asvg="http://schemas.microsoft.com/office/drawing/2016/SVG/main" r:embed="rId16"/>
+                <asvg:svgBlip xmlns:asvg="http://schemas.microsoft.com/office/drawing/2016/SVG/main" r:embed="rId17"/>
               </a:ext>
             </a:extLst>
           </a:blip>
@@ -5527,7 +8312,7 @@
           <p:nvPr/>
         </p:nvPicPr>
         <p:blipFill>
-          <a:blip r:embed="rId31"/>
+          <a:blip r:embed="rId32"/>
           <a:stretch>
             <a:fillRect/>
           </a:stretch>
@@ -5557,7 +8342,7 @@
           <p:nvPr/>
         </p:nvPicPr>
         <p:blipFill>
-          <a:blip r:embed="rId32"/>
+          <a:blip r:embed="rId33"/>
           <a:stretch>
             <a:fillRect/>
           </a:stretch>
@@ -5675,10 +8460,10 @@
           <p:nvPr/>
         </p:nvPicPr>
         <p:blipFill>
-          <a:blip r:embed="rId15">
+          <a:blip r:embed="rId16">
             <a:extLst>
               <a:ext uri="{96DAC541-7B7A-43D3-8B79-37D633B846F1}">
-                <asvg:svgBlip xmlns:asvg="http://schemas.microsoft.com/office/drawing/2016/SVG/main" r:embed="rId16"/>
+                <asvg:svgBlip xmlns:asvg="http://schemas.microsoft.com/office/drawing/2016/SVG/main" r:embed="rId17"/>
               </a:ext>
             </a:extLst>
           </a:blip>
@@ -5741,7 +8526,7 @@
           <p:nvPr/>
         </p:nvPicPr>
         <p:blipFill>
-          <a:blip r:embed="rId2"/>
+          <a:blip r:embed="rId3"/>
           <a:stretch>
             <a:fillRect/>
           </a:stretch>
@@ -5810,10 +8595,10 @@
           <p:nvPr/>
         </p:nvPicPr>
         <p:blipFill>
-          <a:blip r:embed="rId3">
+          <a:blip r:embed="rId4">
             <a:extLst>
               <a:ext uri="{96DAC541-7B7A-43D3-8B79-37D633B846F1}">
-                <asvg:svgBlip xmlns:asvg="http://schemas.microsoft.com/office/drawing/2016/SVG/main" r:embed="rId4"/>
+                <asvg:svgBlip xmlns:asvg="http://schemas.microsoft.com/office/drawing/2016/SVG/main" r:embed="rId5"/>
               </a:ext>
             </a:extLst>
           </a:blip>
@@ -5846,10 +8631,10 @@
           <p:nvPr/>
         </p:nvPicPr>
         <p:blipFill>
-          <a:blip r:embed="rId5">
+          <a:blip r:embed="rId6">
             <a:extLst>
               <a:ext uri="{96DAC541-7B7A-43D3-8B79-37D633B846F1}">
-                <asvg:svgBlip xmlns:asvg="http://schemas.microsoft.com/office/drawing/2016/SVG/main" r:embed="rId6"/>
+                <asvg:svgBlip xmlns:asvg="http://schemas.microsoft.com/office/drawing/2016/SVG/main" r:embed="rId7"/>
               </a:ext>
             </a:extLst>
           </a:blip>
@@ -5882,10 +8667,10 @@
           <p:nvPr/>
         </p:nvPicPr>
         <p:blipFill>
-          <a:blip r:embed="rId7">
+          <a:blip r:embed="rId8">
             <a:extLst>
               <a:ext uri="{96DAC541-7B7A-43D3-8B79-37D633B846F1}">
-                <asvg:svgBlip xmlns:asvg="http://schemas.microsoft.com/office/drawing/2016/SVG/main" r:embed="rId8"/>
+                <asvg:svgBlip xmlns:asvg="http://schemas.microsoft.com/office/drawing/2016/SVG/main" r:embed="rId9"/>
               </a:ext>
             </a:extLst>
           </a:blip>
@@ -5918,10 +8703,10 @@
           <p:nvPr/>
         </p:nvPicPr>
         <p:blipFill>
-          <a:blip r:embed="rId9">
+          <a:blip r:embed="rId10">
             <a:extLst>
               <a:ext uri="{96DAC541-7B7A-43D3-8B79-37D633B846F1}">
-                <asvg:svgBlip xmlns:asvg="http://schemas.microsoft.com/office/drawing/2016/SVG/main" r:embed="rId10"/>
+                <asvg:svgBlip xmlns:asvg="http://schemas.microsoft.com/office/drawing/2016/SVG/main" r:embed="rId11"/>
               </a:ext>
             </a:extLst>
           </a:blip>
@@ -5954,10 +8739,10 @@
           <p:nvPr/>
         </p:nvPicPr>
         <p:blipFill>
-          <a:blip r:embed="rId11">
+          <a:blip r:embed="rId12">
             <a:extLst>
               <a:ext uri="{96DAC541-7B7A-43D3-8B79-37D633B846F1}">
-                <asvg:svgBlip xmlns:asvg="http://schemas.microsoft.com/office/drawing/2016/SVG/main" r:embed="rId12"/>
+                <asvg:svgBlip xmlns:asvg="http://schemas.microsoft.com/office/drawing/2016/SVG/main" r:embed="rId13"/>
               </a:ext>
             </a:extLst>
           </a:blip>
@@ -5990,10 +8775,10 @@
           <p:nvPr/>
         </p:nvPicPr>
         <p:blipFill>
-          <a:blip r:embed="rId13">
+          <a:blip r:embed="rId14">
             <a:extLst>
               <a:ext uri="{96DAC541-7B7A-43D3-8B79-37D633B846F1}">
-                <asvg:svgBlip xmlns:asvg="http://schemas.microsoft.com/office/drawing/2016/SVG/main" r:embed="rId14"/>
+                <asvg:svgBlip xmlns:asvg="http://schemas.microsoft.com/office/drawing/2016/SVG/main" r:embed="rId15"/>
               </a:ext>
             </a:extLst>
           </a:blip>
@@ -6026,10 +8811,10 @@
           <p:nvPr/>
         </p:nvPicPr>
         <p:blipFill>
-          <a:blip r:embed="rId13">
+          <a:blip r:embed="rId14">
             <a:extLst>
               <a:ext uri="{96DAC541-7B7A-43D3-8B79-37D633B846F1}">
-                <asvg:svgBlip xmlns:asvg="http://schemas.microsoft.com/office/drawing/2016/SVG/main" r:embed="rId14"/>
+                <asvg:svgBlip xmlns:asvg="http://schemas.microsoft.com/office/drawing/2016/SVG/main" r:embed="rId15"/>
               </a:ext>
             </a:extLst>
           </a:blip>
@@ -6062,10 +8847,10 @@
           <p:nvPr/>
         </p:nvPicPr>
         <p:blipFill>
-          <a:blip r:embed="rId13">
+          <a:blip r:embed="rId14">
             <a:extLst>
               <a:ext uri="{96DAC541-7B7A-43D3-8B79-37D633B846F1}">
-                <asvg:svgBlip xmlns:asvg="http://schemas.microsoft.com/office/drawing/2016/SVG/main" r:embed="rId14"/>
+                <asvg:svgBlip xmlns:asvg="http://schemas.microsoft.com/office/drawing/2016/SVG/main" r:embed="rId15"/>
               </a:ext>
             </a:extLst>
           </a:blip>
@@ -6098,10 +8883,10 @@
           <p:nvPr/>
         </p:nvPicPr>
         <p:blipFill>
-          <a:blip r:embed="rId13">
+          <a:blip r:embed="rId14">
             <a:extLst>
               <a:ext uri="{96DAC541-7B7A-43D3-8B79-37D633B846F1}">
-                <asvg:svgBlip xmlns:asvg="http://schemas.microsoft.com/office/drawing/2016/SVG/main" r:embed="rId14"/>
+                <asvg:svgBlip xmlns:asvg="http://schemas.microsoft.com/office/drawing/2016/SVG/main" r:embed="rId15"/>
               </a:ext>
             </a:extLst>
           </a:blip>
@@ -6134,10 +8919,10 @@
           <p:nvPr/>
         </p:nvPicPr>
         <p:blipFill>
-          <a:blip r:embed="rId15">
+          <a:blip r:embed="rId16">
             <a:extLst>
               <a:ext uri="{96DAC541-7B7A-43D3-8B79-37D633B846F1}">
-                <asvg:svgBlip xmlns:asvg="http://schemas.microsoft.com/office/drawing/2016/SVG/main" r:embed="rId16"/>
+                <asvg:svgBlip xmlns:asvg="http://schemas.microsoft.com/office/drawing/2016/SVG/main" r:embed="rId17"/>
               </a:ext>
             </a:extLst>
           </a:blip>
@@ -6170,10 +8955,10 @@
           <p:nvPr/>
         </p:nvPicPr>
         <p:blipFill>
-          <a:blip r:embed="rId17">
+          <a:blip r:embed="rId18">
             <a:extLst>
               <a:ext uri="{96DAC541-7B7A-43D3-8B79-37D633B846F1}">
-                <asvg:svgBlip xmlns:asvg="http://schemas.microsoft.com/office/drawing/2016/SVG/main" r:embed="rId18"/>
+                <asvg:svgBlip xmlns:asvg="http://schemas.microsoft.com/office/drawing/2016/SVG/main" r:embed="rId19"/>
               </a:ext>
             </a:extLst>
           </a:blip>
@@ -6206,10 +8991,10 @@
           <p:nvPr/>
         </p:nvPicPr>
         <p:blipFill>
-          <a:blip r:embed="rId19">
+          <a:blip r:embed="rId20">
             <a:extLst>
               <a:ext uri="{96DAC541-7B7A-43D3-8B79-37D633B846F1}">
-                <asvg:svgBlip xmlns:asvg="http://schemas.microsoft.com/office/drawing/2016/SVG/main" r:embed="rId20"/>
+                <asvg:svgBlip xmlns:asvg="http://schemas.microsoft.com/office/drawing/2016/SVG/main" r:embed="rId21"/>
               </a:ext>
             </a:extLst>
           </a:blip>
@@ -6242,10 +9027,10 @@
           <p:nvPr/>
         </p:nvPicPr>
         <p:blipFill>
-          <a:blip r:embed="rId21">
+          <a:blip r:embed="rId22">
             <a:extLst>
               <a:ext uri="{96DAC541-7B7A-43D3-8B79-37D633B846F1}">
-                <asvg:svgBlip xmlns:asvg="http://schemas.microsoft.com/office/drawing/2016/SVG/main" r:embed="rId22"/>
+                <asvg:svgBlip xmlns:asvg="http://schemas.microsoft.com/office/drawing/2016/SVG/main" r:embed="rId23"/>
               </a:ext>
             </a:extLst>
           </a:blip>
@@ -6278,10 +9063,10 @@
           <p:nvPr/>
         </p:nvPicPr>
         <p:blipFill>
-          <a:blip r:embed="rId23">
+          <a:blip r:embed="rId24">
             <a:extLst>
               <a:ext uri="{96DAC541-7B7A-43D3-8B79-37D633B846F1}">
-                <asvg:svgBlip xmlns:asvg="http://schemas.microsoft.com/office/drawing/2016/SVG/main" r:embed="rId24"/>
+                <asvg:svgBlip xmlns:asvg="http://schemas.microsoft.com/office/drawing/2016/SVG/main" r:embed="rId25"/>
               </a:ext>
             </a:extLst>
           </a:blip>
@@ -6314,10 +9099,10 @@
           <p:nvPr/>
         </p:nvPicPr>
         <p:blipFill>
-          <a:blip r:embed="rId25">
+          <a:blip r:embed="rId26">
             <a:extLst>
               <a:ext uri="{96DAC541-7B7A-43D3-8B79-37D633B846F1}">
-                <asvg:svgBlip xmlns:asvg="http://schemas.microsoft.com/office/drawing/2016/SVG/main" r:embed="rId26"/>
+                <asvg:svgBlip xmlns:asvg="http://schemas.microsoft.com/office/drawing/2016/SVG/main" r:embed="rId27"/>
               </a:ext>
             </a:extLst>
           </a:blip>
@@ -6528,10 +9313,10 @@
           <p:nvPr/>
         </p:nvPicPr>
         <p:blipFill>
-          <a:blip r:embed="rId15">
+          <a:blip r:embed="rId16">
             <a:extLst>
               <a:ext uri="{96DAC541-7B7A-43D3-8B79-37D633B846F1}">
-                <asvg:svgBlip xmlns:asvg="http://schemas.microsoft.com/office/drawing/2016/SVG/main" r:embed="rId16"/>
+                <asvg:svgBlip xmlns:asvg="http://schemas.microsoft.com/office/drawing/2016/SVG/main" r:embed="rId17"/>
               </a:ext>
             </a:extLst>
           </a:blip>
@@ -6564,10 +9349,10 @@
           <p:nvPr/>
         </p:nvPicPr>
         <p:blipFill>
-          <a:blip r:embed="rId27">
+          <a:blip r:embed="rId28">
             <a:extLst>
               <a:ext uri="{96DAC541-7B7A-43D3-8B79-37D633B846F1}">
-                <asvg:svgBlip xmlns:asvg="http://schemas.microsoft.com/office/drawing/2016/SVG/main" r:embed="rId28"/>
+                <asvg:svgBlip xmlns:asvg="http://schemas.microsoft.com/office/drawing/2016/SVG/main" r:embed="rId29"/>
               </a:ext>
             </a:extLst>
           </a:blip>
@@ -6723,10 +9508,10 @@
           <p:nvPr/>
         </p:nvPicPr>
         <p:blipFill>
-          <a:blip r:embed="rId29">
+          <a:blip r:embed="rId30">
             <a:extLst>
               <a:ext uri="{96DAC541-7B7A-43D3-8B79-37D633B846F1}">
-                <asvg:svgBlip xmlns:asvg="http://schemas.microsoft.com/office/drawing/2016/SVG/main" r:embed="rId30"/>
+                <asvg:svgBlip xmlns:asvg="http://schemas.microsoft.com/office/drawing/2016/SVG/main" r:embed="rId31"/>
               </a:ext>
             </a:extLst>
           </a:blip>
@@ -6855,16 +9640,16 @@
               </a:lnSpc>
             </a:pPr>
             <a:r>
-              <a:rPr lang="en-US" b="1">
+              <a:rPr lang="en-US" b="1" dirty="0">
                 <a:solidFill>
                   <a:srgbClr val="000000"/>
                 </a:solidFill>
                 <a:ea typeface="Calibri"/>
                 <a:cs typeface="Calibri"/>
               </a:rPr>
-              <a:t>Information</a:t>
-            </a:r>
-            <a:endParaRPr lang="en-US">
+              <a:t>Information Flow</a:t>
+            </a:r>
+            <a:endParaRPr lang="en-US" dirty="0">
               <a:solidFill>
                 <a:srgbClr val="000000"/>
               </a:solidFill>
@@ -6919,16 +9704,16 @@
               </a:lnSpc>
             </a:pPr>
             <a:r>
-              <a:rPr lang="en-US" b="1">
+              <a:rPr lang="en-US" b="1" dirty="0">
                 <a:solidFill>
                   <a:srgbClr val="000000"/>
                 </a:solidFill>
                 <a:ea typeface="Calibri"/>
                 <a:cs typeface="Calibri"/>
               </a:rPr>
-              <a:t>Receptors</a:t>
-            </a:r>
-            <a:endParaRPr lang="en-US">
+              <a:t>Stimuli</a:t>
+            </a:r>
+            <a:endParaRPr lang="en-US" dirty="0">
               <a:solidFill>
                 <a:srgbClr val="000000"/>
               </a:solidFill>
@@ -7015,10 +9800,10 @@
           <p:nvPr/>
         </p:nvPicPr>
         <p:blipFill>
-          <a:blip r:embed="rId15">
+          <a:blip r:embed="rId16">
             <a:extLst>
               <a:ext uri="{96DAC541-7B7A-43D3-8B79-37D633B846F1}">
-                <asvg:svgBlip xmlns:asvg="http://schemas.microsoft.com/office/drawing/2016/SVG/main" r:embed="rId16"/>
+                <asvg:svgBlip xmlns:asvg="http://schemas.microsoft.com/office/drawing/2016/SVG/main" r:embed="rId17"/>
               </a:ext>
             </a:extLst>
           </a:blip>
@@ -7179,7 +9964,7 @@
           <p:nvPr/>
         </p:nvPicPr>
         <p:blipFill>
-          <a:blip r:embed="rId31"/>
+          <a:blip r:embed="rId32"/>
           <a:stretch>
             <a:fillRect/>
           </a:stretch>
@@ -7209,7 +9994,7 @@
           <p:nvPr/>
         </p:nvPicPr>
         <p:blipFill>
-          <a:blip r:embed="rId32"/>
+          <a:blip r:embed="rId33"/>
           <a:stretch>
             <a:fillRect/>
           </a:stretch>
@@ -7327,10 +10112,10 @@
           <p:nvPr/>
         </p:nvPicPr>
         <p:blipFill>
-          <a:blip r:embed="rId15">
+          <a:blip r:embed="rId16">
             <a:extLst>
               <a:ext uri="{96DAC541-7B7A-43D3-8B79-37D633B846F1}">
-                <asvg:svgBlip xmlns:asvg="http://schemas.microsoft.com/office/drawing/2016/SVG/main" r:embed="rId16"/>
+                <asvg:svgBlip xmlns:asvg="http://schemas.microsoft.com/office/drawing/2016/SVG/main" r:embed="rId17"/>
               </a:ext>
             </a:extLst>
           </a:blip>
@@ -8299,7 +11084,7 @@
               </a:rPr>
               <a:t>Repeat with new processing or learning idea until satisfied</a:t>
             </a:r>
-            <a:endParaRPr lang="en-US"/>
+            <a:endParaRPr lang="en-US" dirty="0"/>
           </a:p>
           <a:p>
             <a:pPr algn="ctr"/>
@@ -8406,7 +11191,7 @@
           <p:nvPr/>
         </p:nvPicPr>
         <p:blipFill>
-          <a:blip r:embed="rId2"/>
+          <a:blip r:embed="rId3"/>
           <a:stretch>
             <a:fillRect/>
           </a:stretch>
@@ -8436,7 +11221,7 @@
           <p:nvPr/>
         </p:nvPicPr>
         <p:blipFill>
-          <a:blip r:embed="rId2"/>
+          <a:blip r:embed="rId3"/>
           <a:stretch>
             <a:fillRect/>
           </a:stretch>
@@ -8466,7 +11251,7 @@
           <p:nvPr/>
         </p:nvPicPr>
         <p:blipFill>
-          <a:blip r:embed="rId2"/>
+          <a:blip r:embed="rId3"/>
           <a:stretch>
             <a:fillRect/>
           </a:stretch>
@@ -8496,7 +11281,7 @@
           <p:nvPr/>
         </p:nvPicPr>
         <p:blipFill>
-          <a:blip r:embed="rId2"/>
+          <a:blip r:embed="rId3"/>
           <a:stretch>
             <a:fillRect/>
           </a:stretch>
@@ -8526,7 +11311,7 @@
           <p:nvPr/>
         </p:nvPicPr>
         <p:blipFill>
-          <a:blip r:embed="rId2"/>
+          <a:blip r:embed="rId3"/>
           <a:stretch>
             <a:fillRect/>
           </a:stretch>
@@ -8556,10 +11341,10 @@
           <p:nvPr/>
         </p:nvPicPr>
         <p:blipFill>
-          <a:blip r:embed="rId3">
+          <a:blip r:embed="rId4">
             <a:extLst>
               <a:ext uri="{96DAC541-7B7A-43D3-8B79-37D633B846F1}">
-                <asvg:svgBlip xmlns:asvg="http://schemas.microsoft.com/office/drawing/2016/SVG/main" r:embed="rId4"/>
+                <asvg:svgBlip xmlns:asvg="http://schemas.microsoft.com/office/drawing/2016/SVG/main" r:embed="rId5"/>
               </a:ext>
             </a:extLst>
           </a:blip>
@@ -8592,10 +11377,10 @@
           <p:nvPr/>
         </p:nvPicPr>
         <p:blipFill>
-          <a:blip r:embed="rId3">
+          <a:blip r:embed="rId4">
             <a:extLst>
               <a:ext uri="{96DAC541-7B7A-43D3-8B79-37D633B846F1}">
-                <asvg:svgBlip xmlns:asvg="http://schemas.microsoft.com/office/drawing/2016/SVG/main" r:embed="rId4"/>
+                <asvg:svgBlip xmlns:asvg="http://schemas.microsoft.com/office/drawing/2016/SVG/main" r:embed="rId5"/>
               </a:ext>
             </a:extLst>
           </a:blip>
@@ -8667,13 +11452,12 @@
                   <a:srgbClr val="000000"/>
                 </a:solidFill>
               </a:rPr>
-              <a:t>core</a:t>
+              <a:t>score</a:t>
             </a:r>
             <a:r>
               <a:rPr lang="en-US" dirty="0"/>
               <a:t> of 0.45</a:t>
             </a:r>
-            <a:endParaRPr lang="en-US"/>
           </a:p>
         </p:txBody>
       </p:sp>
@@ -8692,10 +11476,10 @@
           <p:nvPr/>
         </p:nvPicPr>
         <p:blipFill>
-          <a:blip r:embed="rId5">
+          <a:blip r:embed="rId6">
             <a:extLst>
               <a:ext uri="{96DAC541-7B7A-43D3-8B79-37D633B846F1}">
-                <asvg:svgBlip xmlns:asvg="http://schemas.microsoft.com/office/drawing/2016/SVG/main" r:embed="rId6"/>
+                <asvg:svgBlip xmlns:asvg="http://schemas.microsoft.com/office/drawing/2016/SVG/main" r:embed="rId7"/>
               </a:ext>
             </a:extLst>
           </a:blip>
@@ -8728,10 +11512,10 @@
           <p:nvPr/>
         </p:nvPicPr>
         <p:blipFill>
-          <a:blip r:embed="rId7">
+          <a:blip r:embed="rId8">
             <a:extLst>
               <a:ext uri="{96DAC541-7B7A-43D3-8B79-37D633B846F1}">
-                <asvg:svgBlip xmlns:asvg="http://schemas.microsoft.com/office/drawing/2016/SVG/main" r:embed="rId8"/>
+                <asvg:svgBlip xmlns:asvg="http://schemas.microsoft.com/office/drawing/2016/SVG/main" r:embed="rId9"/>
               </a:ext>
             </a:extLst>
           </a:blip>
@@ -8764,10 +11548,10 @@
           <p:nvPr/>
         </p:nvPicPr>
         <p:blipFill>
-          <a:blip r:embed="rId7">
+          <a:blip r:embed="rId8">
             <a:extLst>
               <a:ext uri="{96DAC541-7B7A-43D3-8B79-37D633B846F1}">
-                <asvg:svgBlip xmlns:asvg="http://schemas.microsoft.com/office/drawing/2016/SVG/main" r:embed="rId8"/>
+                <asvg:svgBlip xmlns:asvg="http://schemas.microsoft.com/office/drawing/2016/SVG/main" r:embed="rId9"/>
               </a:ext>
             </a:extLst>
           </a:blip>
@@ -8956,10 +11740,10 @@
           <p:nvPr/>
         </p:nvPicPr>
         <p:blipFill>
-          <a:blip r:embed="rId7">
+          <a:blip r:embed="rId8">
             <a:extLst>
               <a:ext uri="{96DAC541-7B7A-43D3-8B79-37D633B846F1}">
-                <asvg:svgBlip xmlns:asvg="http://schemas.microsoft.com/office/drawing/2016/SVG/main" r:embed="rId8"/>
+                <asvg:svgBlip xmlns:asvg="http://schemas.microsoft.com/office/drawing/2016/SVG/main" r:embed="rId9"/>
               </a:ext>
             </a:extLst>
           </a:blip>
@@ -8992,10 +11776,10 @@
           <p:nvPr/>
         </p:nvPicPr>
         <p:blipFill>
-          <a:blip r:embed="rId7">
+          <a:blip r:embed="rId8">
             <a:extLst>
               <a:ext uri="{96DAC541-7B7A-43D3-8B79-37D633B846F1}">
-                <asvg:svgBlip xmlns:asvg="http://schemas.microsoft.com/office/drawing/2016/SVG/main" r:embed="rId8"/>
+                <asvg:svgBlip xmlns:asvg="http://schemas.microsoft.com/office/drawing/2016/SVG/main" r:embed="rId9"/>
               </a:ext>
             </a:extLst>
           </a:blip>
@@ -9347,4 +12131,299 @@
     </a:ext>
   </a:extLst>
 </a:theme>
+</file>
+
+<file path=ppt/theme/theme2.xml><?xml version="1.0" encoding="utf-8"?>
+<a:theme xmlns:a="http://schemas.openxmlformats.org/drawingml/2006/main" name="Office">
+  <a:themeElements>
+    <a:clrScheme name="Office">
+      <a:dk1>
+        <a:sysClr val="windowText" lastClr="000000"/>
+      </a:dk1>
+      <a:lt1>
+        <a:sysClr val="window" lastClr="FFFFFF"/>
+      </a:lt1>
+      <a:dk2>
+        <a:srgbClr val="44546A"/>
+      </a:dk2>
+      <a:lt2>
+        <a:srgbClr val="E7E6E6"/>
+      </a:lt2>
+      <a:accent1>
+        <a:srgbClr val="4472C4"/>
+      </a:accent1>
+      <a:accent2>
+        <a:srgbClr val="ED7D31"/>
+      </a:accent2>
+      <a:accent3>
+        <a:srgbClr val="A5A5A5"/>
+      </a:accent3>
+      <a:accent4>
+        <a:srgbClr val="FFC000"/>
+      </a:accent4>
+      <a:accent5>
+        <a:srgbClr val="5B9BD5"/>
+      </a:accent5>
+      <a:accent6>
+        <a:srgbClr val="70AD47"/>
+      </a:accent6>
+      <a:hlink>
+        <a:srgbClr val="0563C1"/>
+      </a:hlink>
+      <a:folHlink>
+        <a:srgbClr val="954F72"/>
+      </a:folHlink>
+    </a:clrScheme>
+    <a:fontScheme name="Office">
+      <a:majorFont>
+        <a:latin typeface="Calibri Light" panose="020F0302020204030204"/>
+        <a:ea typeface=""/>
+        <a:cs typeface=""/>
+        <a:font script="Jpan" typeface="游ゴシック Light"/>
+        <a:font script="Hang" typeface="맑은 고딕"/>
+        <a:font script="Hans" typeface="等线 Light"/>
+        <a:font script="Hant" typeface="新細明體"/>
+        <a:font script="Arab" typeface="Times New Roman"/>
+        <a:font script="Hebr" typeface="Times New Roman"/>
+        <a:font script="Thai" typeface="Angsana New"/>
+        <a:font script="Ethi" typeface="Nyala"/>
+        <a:font script="Beng" typeface="Vrinda"/>
+        <a:font script="Gujr" typeface="Shruti"/>
+        <a:font script="Khmr" typeface="MoolBoran"/>
+        <a:font script="Knda" typeface="Tunga"/>
+        <a:font script="Guru" typeface="Raavi"/>
+        <a:font script="Cans" typeface="Euphemia"/>
+        <a:font script="Cher" typeface="Plantagenet Cherokee"/>
+        <a:font script="Yiii" typeface="Microsoft Yi Baiti"/>
+        <a:font script="Tibt" typeface="Microsoft Himalaya"/>
+        <a:font script="Thaa" typeface="MV Boli"/>
+        <a:font script="Deva" typeface="Mangal"/>
+        <a:font script="Telu" typeface="Gautami"/>
+        <a:font script="Taml" typeface="Latha"/>
+        <a:font script="Syrc" typeface="Estrangelo Edessa"/>
+        <a:font script="Orya" typeface="Kalinga"/>
+        <a:font script="Mlym" typeface="Kartika"/>
+        <a:font script="Laoo" typeface="DokChampa"/>
+        <a:font script="Sinh" typeface="Iskoola Pota"/>
+        <a:font script="Mong" typeface="Mongolian Baiti"/>
+        <a:font script="Viet" typeface="Times New Roman"/>
+        <a:font script="Uigh" typeface="Microsoft Uighur"/>
+        <a:font script="Geor" typeface="Sylfaen"/>
+        <a:font script="Armn" typeface="Arial"/>
+        <a:font script="Bugi" typeface="Leelawadee UI"/>
+        <a:font script="Bopo" typeface="Microsoft JhengHei"/>
+        <a:font script="Java" typeface="Javanese Text"/>
+        <a:font script="Lisu" typeface="Segoe UI"/>
+        <a:font script="Mymr" typeface="Myanmar Text"/>
+        <a:font script="Nkoo" typeface="Ebrima"/>
+        <a:font script="Olck" typeface="Nirmala UI"/>
+        <a:font script="Osma" typeface="Ebrima"/>
+        <a:font script="Phag" typeface="Phagspa"/>
+        <a:font script="Syrn" typeface="Estrangelo Edessa"/>
+        <a:font script="Syrj" typeface="Estrangelo Edessa"/>
+        <a:font script="Syre" typeface="Estrangelo Edessa"/>
+        <a:font script="Sora" typeface="Nirmala UI"/>
+        <a:font script="Tale" typeface="Microsoft Tai Le"/>
+        <a:font script="Talu" typeface="Microsoft New Tai Lue"/>
+        <a:font script="Tfng" typeface="Ebrima"/>
+      </a:majorFont>
+      <a:minorFont>
+        <a:latin typeface="Calibri" panose="020F0502020204030204"/>
+        <a:ea typeface=""/>
+        <a:cs typeface=""/>
+        <a:font script="Jpan" typeface="游ゴシック"/>
+        <a:font script="Hang" typeface="맑은 고딕"/>
+        <a:font script="Hans" typeface="等线"/>
+        <a:font script="Hant" typeface="新細明體"/>
+        <a:font script="Arab" typeface="Arial"/>
+        <a:font script="Hebr" typeface="Arial"/>
+        <a:font script="Thai" typeface="Cordia New"/>
+        <a:font script="Ethi" typeface="Nyala"/>
+        <a:font script="Beng" typeface="Vrinda"/>
+        <a:font script="Gujr" typeface="Shruti"/>
+        <a:font script="Khmr" typeface="DaunPenh"/>
+        <a:font script="Knda" typeface="Tunga"/>
+        <a:font script="Guru" typeface="Raavi"/>
+        <a:font script="Cans" typeface="Euphemia"/>
+        <a:font script="Cher" typeface="Plantagenet Cherokee"/>
+        <a:font script="Yiii" typeface="Microsoft Yi Baiti"/>
+        <a:font script="Tibt" typeface="Microsoft Himalaya"/>
+        <a:font script="Thaa" typeface="MV Boli"/>
+        <a:font script="Deva" typeface="Mangal"/>
+        <a:font script="Telu" typeface="Gautami"/>
+        <a:font script="Taml" typeface="Latha"/>
+        <a:font script="Syrc" typeface="Estrangelo Edessa"/>
+        <a:font script="Orya" typeface="Kalinga"/>
+        <a:font script="Mlym" typeface="Kartika"/>
+        <a:font script="Laoo" typeface="DokChampa"/>
+        <a:font script="Sinh" typeface="Iskoola Pota"/>
+        <a:font script="Mong" typeface="Mongolian Baiti"/>
+        <a:font script="Viet" typeface="Arial"/>
+        <a:font script="Uigh" typeface="Microsoft Uighur"/>
+        <a:font script="Geor" typeface="Sylfaen"/>
+        <a:font script="Armn" typeface="Arial"/>
+        <a:font script="Bugi" typeface="Leelawadee UI"/>
+        <a:font script="Bopo" typeface="Microsoft JhengHei"/>
+        <a:font script="Java" typeface="Javanese Text"/>
+        <a:font script="Lisu" typeface="Segoe UI"/>
+        <a:font script="Mymr" typeface="Myanmar Text"/>
+        <a:font script="Nkoo" typeface="Ebrima"/>
+        <a:font script="Olck" typeface="Nirmala UI"/>
+        <a:font script="Osma" typeface="Ebrima"/>
+        <a:font script="Phag" typeface="Phagspa"/>
+        <a:font script="Syrn" typeface="Estrangelo Edessa"/>
+        <a:font script="Syrj" typeface="Estrangelo Edessa"/>
+        <a:font script="Syre" typeface="Estrangelo Edessa"/>
+        <a:font script="Sora" typeface="Nirmala UI"/>
+        <a:font script="Tale" typeface="Microsoft Tai Le"/>
+        <a:font script="Talu" typeface="Microsoft New Tai Lue"/>
+        <a:font script="Tfng" typeface="Ebrima"/>
+      </a:minorFont>
+    </a:fontScheme>
+    <a:fmtScheme name="Office">
+      <a:fillStyleLst>
+        <a:solidFill>
+          <a:schemeClr val="phClr"/>
+        </a:solidFill>
+        <a:gradFill rotWithShape="1">
+          <a:gsLst>
+            <a:gs pos="0">
+              <a:schemeClr val="phClr">
+                <a:lumMod val="110000"/>
+                <a:satMod val="105000"/>
+                <a:tint val="67000"/>
+              </a:schemeClr>
+            </a:gs>
+            <a:gs pos="50000">
+              <a:schemeClr val="phClr">
+                <a:lumMod val="105000"/>
+                <a:satMod val="103000"/>
+                <a:tint val="73000"/>
+              </a:schemeClr>
+            </a:gs>
+            <a:gs pos="100000">
+              <a:schemeClr val="phClr">
+                <a:lumMod val="105000"/>
+                <a:satMod val="109000"/>
+                <a:tint val="81000"/>
+              </a:schemeClr>
+            </a:gs>
+          </a:gsLst>
+          <a:lin ang="5400000" scaled="0"/>
+        </a:gradFill>
+        <a:gradFill rotWithShape="1">
+          <a:gsLst>
+            <a:gs pos="0">
+              <a:schemeClr val="phClr">
+                <a:satMod val="103000"/>
+                <a:lumMod val="102000"/>
+                <a:tint val="94000"/>
+              </a:schemeClr>
+            </a:gs>
+            <a:gs pos="50000">
+              <a:schemeClr val="phClr">
+                <a:satMod val="110000"/>
+                <a:lumMod val="100000"/>
+                <a:shade val="100000"/>
+              </a:schemeClr>
+            </a:gs>
+            <a:gs pos="100000">
+              <a:schemeClr val="phClr">
+                <a:lumMod val="99000"/>
+                <a:satMod val="120000"/>
+                <a:shade val="78000"/>
+              </a:schemeClr>
+            </a:gs>
+          </a:gsLst>
+          <a:lin ang="5400000" scaled="0"/>
+        </a:gradFill>
+      </a:fillStyleLst>
+      <a:lnStyleLst>
+        <a:ln w="6350" cap="flat" cmpd="sng" algn="ctr">
+          <a:solidFill>
+            <a:schemeClr val="phClr"/>
+          </a:solidFill>
+          <a:prstDash val="solid"/>
+          <a:miter lim="800000"/>
+        </a:ln>
+        <a:ln w="12700" cap="flat" cmpd="sng" algn="ctr">
+          <a:solidFill>
+            <a:schemeClr val="phClr"/>
+          </a:solidFill>
+          <a:prstDash val="solid"/>
+          <a:miter lim="800000"/>
+        </a:ln>
+        <a:ln w="19050" cap="flat" cmpd="sng" algn="ctr">
+          <a:solidFill>
+            <a:schemeClr val="phClr"/>
+          </a:solidFill>
+          <a:prstDash val="solid"/>
+          <a:miter lim="800000"/>
+        </a:ln>
+      </a:lnStyleLst>
+      <a:effectStyleLst>
+        <a:effectStyle>
+          <a:effectLst/>
+        </a:effectStyle>
+        <a:effectStyle>
+          <a:effectLst/>
+        </a:effectStyle>
+        <a:effectStyle>
+          <a:effectLst>
+            <a:outerShdw blurRad="57150" dist="19050" dir="5400000" algn="ctr" rotWithShape="0">
+              <a:srgbClr val="000000">
+                <a:alpha val="63000"/>
+              </a:srgbClr>
+            </a:outerShdw>
+          </a:effectLst>
+        </a:effectStyle>
+      </a:effectStyleLst>
+      <a:bgFillStyleLst>
+        <a:solidFill>
+          <a:schemeClr val="phClr"/>
+        </a:solidFill>
+        <a:solidFill>
+          <a:schemeClr val="phClr">
+            <a:tint val="95000"/>
+            <a:satMod val="170000"/>
+          </a:schemeClr>
+        </a:solidFill>
+        <a:gradFill rotWithShape="1">
+          <a:gsLst>
+            <a:gs pos="0">
+              <a:schemeClr val="phClr">
+                <a:tint val="93000"/>
+                <a:satMod val="150000"/>
+                <a:shade val="98000"/>
+                <a:lumMod val="102000"/>
+              </a:schemeClr>
+            </a:gs>
+            <a:gs pos="50000">
+              <a:schemeClr val="phClr">
+                <a:tint val="98000"/>
+                <a:satMod val="130000"/>
+                <a:shade val="90000"/>
+                <a:lumMod val="103000"/>
+              </a:schemeClr>
+            </a:gs>
+            <a:gs pos="100000">
+              <a:schemeClr val="phClr">
+                <a:shade val="63000"/>
+                <a:satMod val="120000"/>
+              </a:schemeClr>
+            </a:gs>
+          </a:gsLst>
+          <a:lin ang="5400000" scaled="0"/>
+        </a:gradFill>
+      </a:bgFillStyleLst>
+    </a:fmtScheme>
+  </a:themeElements>
+  <a:objectDefaults/>
+  <a:extraClrSchemeLst/>
+  <a:extLst>
+    <a:ext uri="{05A4C25C-085E-4340-85A3-A5531E510DB2}">
+      <thm15:themeFamily xmlns:thm15="http://schemas.microsoft.com/office/thememl/2012/main" name="Office Theme" id="{62F939B6-93AF-4DB8-9C6B-D6C7DFDC589F}" vid="{4A3C46E8-61CC-4603-A589-7422A47A8E4A}"/>
+    </a:ext>
+  </a:extLst>
+</a:theme>
 </file>
</xml_diff>